<commit_message>
Updated: finished Idea Sheets and Future State VSM
</commit_message>
<xml_diff>
--- a/Milestone 2/ENSE 470 Milestone 2.pptx
+++ b/Milestone 2/ENSE 470 Milestone 2.pptx
@@ -173,7 +173,7 @@
           <a:noFill/>
           <a:extLst>
             <a:ext uri="{909E8E84-426E-40dd-AFC4-6F175D3DCCD1}">
-              <a14:hiddenFill xmlns:a14="http://schemas.microsoft.com/office/drawing/2010/main" xmlns="">
+              <a14:hiddenFill xmlns="" xmlns:a14="http://schemas.microsoft.com/office/drawing/2010/main">
                 <a:solidFill>
                   <a:srgbClr val="FFFFFF"/>
                 </a:solidFill>
@@ -233,7 +233,7 @@
             </a:ln>
             <a:extLst>
               <a:ext uri="{91240B29-F687-4f45-9708-019B960494DF}">
-                <a14:hiddenLine xmlns:a14="http://schemas.microsoft.com/office/drawing/2010/main" xmlns="" w="9525">
+                <a14:hiddenLine xmlns="" xmlns:a14="http://schemas.microsoft.com/office/drawing/2010/main" w="9525">
                   <a:solidFill>
                     <a:srgbClr val="000000"/>
                   </a:solidFill>
@@ -323,7 +323,7 @@
             </a:ln>
             <a:extLst>
               <a:ext uri="{91240B29-F687-4f45-9708-019B960494DF}">
-                <a14:hiddenLine xmlns:a14="http://schemas.microsoft.com/office/drawing/2010/main" xmlns="" w="9525">
+                <a14:hiddenLine xmlns="" xmlns:a14="http://schemas.microsoft.com/office/drawing/2010/main" w="9525">
                   <a:solidFill>
                     <a:srgbClr val="000000"/>
                   </a:solidFill>
@@ -413,7 +413,7 @@
             </a:ln>
             <a:extLst>
               <a:ext uri="{91240B29-F687-4f45-9708-019B960494DF}">
-                <a14:hiddenLine xmlns:a14="http://schemas.microsoft.com/office/drawing/2010/main" xmlns="" w="9525">
+                <a14:hiddenLine xmlns="" xmlns:a14="http://schemas.microsoft.com/office/drawing/2010/main" w="9525">
                   <a:solidFill>
                     <a:srgbClr val="000000"/>
                   </a:solidFill>
@@ -447,7 +447,7 @@
             </a:ln>
             <a:extLst>
               <a:ext uri="{91240B29-F687-4f45-9708-019B960494DF}">
-                <a14:hiddenLine xmlns:a14="http://schemas.microsoft.com/office/drawing/2010/main" xmlns="" w="9525">
+                <a14:hiddenLine xmlns="" xmlns:a14="http://schemas.microsoft.com/office/drawing/2010/main" w="9525">
                   <a:solidFill>
                     <a:srgbClr val="000000"/>
                   </a:solidFill>
@@ -537,7 +537,7 @@
             </a:ln>
             <a:extLst>
               <a:ext uri="{91240B29-F687-4f45-9708-019B960494DF}">
-                <a14:hiddenLine xmlns:a14="http://schemas.microsoft.com/office/drawing/2010/main" xmlns="" w="9525">
+                <a14:hiddenLine xmlns="" xmlns:a14="http://schemas.microsoft.com/office/drawing/2010/main" w="9525">
                   <a:solidFill>
                     <a:srgbClr val="000000"/>
                   </a:solidFill>
@@ -599,7 +599,7 @@
             </a:ln>
             <a:extLst>
               <a:ext uri="{91240B29-F687-4f45-9708-019B960494DF}">
-                <a14:hiddenLine xmlns:a14="http://schemas.microsoft.com/office/drawing/2010/main" xmlns="" w="9525">
+                <a14:hiddenLine xmlns="" xmlns:a14="http://schemas.microsoft.com/office/drawing/2010/main" w="9525">
                   <a:solidFill>
                     <a:srgbClr val="000000"/>
                   </a:solidFill>
@@ -661,7 +661,7 @@
             </a:ln>
             <a:extLst>
               <a:ext uri="{91240B29-F687-4f45-9708-019B960494DF}">
-                <a14:hiddenLine xmlns:a14="http://schemas.microsoft.com/office/drawing/2010/main" xmlns="" w="9525">
+                <a14:hiddenLine xmlns="" xmlns:a14="http://schemas.microsoft.com/office/drawing/2010/main" w="9525">
                   <a:solidFill>
                     <a:srgbClr val="000000"/>
                   </a:solidFill>
@@ -751,7 +751,7 @@
             </a:ln>
             <a:extLst>
               <a:ext uri="{91240B29-F687-4f45-9708-019B960494DF}">
-                <a14:hiddenLine xmlns:a14="http://schemas.microsoft.com/office/drawing/2010/main" xmlns="" w="9525">
+                <a14:hiddenLine xmlns="" xmlns:a14="http://schemas.microsoft.com/office/drawing/2010/main" w="9525">
                   <a:solidFill>
                     <a:srgbClr val="000000"/>
                   </a:solidFill>
@@ -813,7 +813,7 @@
             </a:ln>
             <a:extLst>
               <a:ext uri="{91240B29-F687-4f45-9708-019B960494DF}">
-                <a14:hiddenLine xmlns:a14="http://schemas.microsoft.com/office/drawing/2010/main" xmlns="" w="9525">
+                <a14:hiddenLine xmlns="" xmlns:a14="http://schemas.microsoft.com/office/drawing/2010/main" w="9525">
                   <a:solidFill>
                     <a:srgbClr val="000000"/>
                   </a:solidFill>
@@ -875,7 +875,7 @@
             </a:ln>
             <a:extLst>
               <a:ext uri="{91240B29-F687-4f45-9708-019B960494DF}">
-                <a14:hiddenLine xmlns:a14="http://schemas.microsoft.com/office/drawing/2010/main" xmlns="" w="9525">
+                <a14:hiddenLine xmlns="" xmlns:a14="http://schemas.microsoft.com/office/drawing/2010/main" w="9525">
                   <a:solidFill>
                     <a:srgbClr val="000000"/>
                   </a:solidFill>
@@ -965,7 +965,7 @@
             </a:ln>
             <a:extLst>
               <a:ext uri="{91240B29-F687-4f45-9708-019B960494DF}">
-                <a14:hiddenLine xmlns:a14="http://schemas.microsoft.com/office/drawing/2010/main" xmlns="" w="9525">
+                <a14:hiddenLine xmlns="" xmlns:a14="http://schemas.microsoft.com/office/drawing/2010/main" w="9525">
                   <a:solidFill>
                     <a:srgbClr val="000000"/>
                   </a:solidFill>
@@ -1055,7 +1055,7 @@
             </a:ln>
             <a:extLst>
               <a:ext uri="{91240B29-F687-4f45-9708-019B960494DF}">
-                <a14:hiddenLine xmlns:a14="http://schemas.microsoft.com/office/drawing/2010/main" xmlns="" w="9525">
+                <a14:hiddenLine xmlns="" xmlns:a14="http://schemas.microsoft.com/office/drawing/2010/main" w="9525">
                   <a:solidFill>
                     <a:srgbClr val="000000"/>
                   </a:solidFill>
@@ -1117,7 +1117,7 @@
             </a:ln>
             <a:extLst>
               <a:ext uri="{91240B29-F687-4f45-9708-019B960494DF}">
-                <a14:hiddenLine xmlns:a14="http://schemas.microsoft.com/office/drawing/2010/main" xmlns="" w="9525">
+                <a14:hiddenLine xmlns="" xmlns:a14="http://schemas.microsoft.com/office/drawing/2010/main" w="9525">
                   <a:solidFill>
                     <a:srgbClr val="000000"/>
                   </a:solidFill>
@@ -1227,7 +1227,7 @@
             </a:ln>
             <a:extLst>
               <a:ext uri="{91240B29-F687-4f45-9708-019B960494DF}">
-                <a14:hiddenLine xmlns:a14="http://schemas.microsoft.com/office/drawing/2010/main" xmlns="" w="9525">
+                <a14:hiddenLine xmlns="" xmlns:a14="http://schemas.microsoft.com/office/drawing/2010/main" w="9525">
                   <a:solidFill>
                     <a:srgbClr val="000000"/>
                   </a:solidFill>
@@ -1289,7 +1289,7 @@
             </a:ln>
             <a:extLst>
               <a:ext uri="{91240B29-F687-4f45-9708-019B960494DF}">
-                <a14:hiddenLine xmlns:a14="http://schemas.microsoft.com/office/drawing/2010/main" xmlns="" w="9525">
+                <a14:hiddenLine xmlns="" xmlns:a14="http://schemas.microsoft.com/office/drawing/2010/main" w="9525">
                   <a:solidFill>
                     <a:srgbClr val="000000"/>
                   </a:solidFill>
@@ -1379,7 +1379,7 @@
             </a:ln>
             <a:extLst>
               <a:ext uri="{91240B29-F687-4f45-9708-019B960494DF}">
-                <a14:hiddenLine xmlns:a14="http://schemas.microsoft.com/office/drawing/2010/main" xmlns="" w="9525">
+                <a14:hiddenLine xmlns="" xmlns:a14="http://schemas.microsoft.com/office/drawing/2010/main" w="9525">
                   <a:solidFill>
                     <a:srgbClr val="000000"/>
                   </a:solidFill>
@@ -1469,7 +1469,7 @@
             </a:ln>
             <a:extLst>
               <a:ext uri="{91240B29-F687-4f45-9708-019B960494DF}">
-                <a14:hiddenLine xmlns:a14="http://schemas.microsoft.com/office/drawing/2010/main" xmlns="" w="9525">
+                <a14:hiddenLine xmlns="" xmlns:a14="http://schemas.microsoft.com/office/drawing/2010/main" w="9525">
                   <a:solidFill>
                     <a:srgbClr val="000000"/>
                   </a:solidFill>
@@ -1531,7 +1531,7 @@
             </a:ln>
             <a:extLst>
               <a:ext uri="{91240B29-F687-4f45-9708-019B960494DF}">
-                <a14:hiddenLine xmlns:a14="http://schemas.microsoft.com/office/drawing/2010/main" xmlns="" w="9525">
+                <a14:hiddenLine xmlns="" xmlns:a14="http://schemas.microsoft.com/office/drawing/2010/main" w="9525">
                   <a:solidFill>
                     <a:srgbClr val="000000"/>
                   </a:solidFill>
@@ -1621,7 +1621,7 @@
             </a:ln>
             <a:extLst>
               <a:ext uri="{91240B29-F687-4f45-9708-019B960494DF}">
-                <a14:hiddenLine xmlns:a14="http://schemas.microsoft.com/office/drawing/2010/main" xmlns="" w="9525">
+                <a14:hiddenLine xmlns="" xmlns:a14="http://schemas.microsoft.com/office/drawing/2010/main" w="9525">
                   <a:solidFill>
                     <a:srgbClr val="000000"/>
                   </a:solidFill>
@@ -1711,7 +1711,7 @@
             </a:ln>
             <a:extLst>
               <a:ext uri="{91240B29-F687-4f45-9708-019B960494DF}">
-                <a14:hiddenLine xmlns:a14="http://schemas.microsoft.com/office/drawing/2010/main" xmlns="" w="9525">
+                <a14:hiddenLine xmlns="" xmlns:a14="http://schemas.microsoft.com/office/drawing/2010/main" w="9525">
                   <a:solidFill>
                     <a:srgbClr val="000000"/>
                   </a:solidFill>
@@ -1767,7 +1767,7 @@
             </a:ln>
             <a:extLst>
               <a:ext uri="{91240B29-F687-4f45-9708-019B960494DF}">
-                <a14:hiddenLine xmlns:a14="http://schemas.microsoft.com/office/drawing/2010/main" xmlns="" w="9525">
+                <a14:hiddenLine xmlns="" xmlns:a14="http://schemas.microsoft.com/office/drawing/2010/main" w="9525">
                   <a:solidFill>
                     <a:srgbClr val="000000"/>
                   </a:solidFill>
@@ -1857,7 +1857,7 @@
             </a:ln>
             <a:extLst>
               <a:ext uri="{91240B29-F687-4f45-9708-019B960494DF}">
-                <a14:hiddenLine xmlns:a14="http://schemas.microsoft.com/office/drawing/2010/main" xmlns="" w="9525">
+                <a14:hiddenLine xmlns="" xmlns:a14="http://schemas.microsoft.com/office/drawing/2010/main" w="9525">
                   <a:solidFill>
                     <a:srgbClr val="000000"/>
                   </a:solidFill>
@@ -1913,7 +1913,7 @@
             </a:ln>
             <a:extLst>
               <a:ext uri="{91240B29-F687-4f45-9708-019B960494DF}">
-                <a14:hiddenLine xmlns:a14="http://schemas.microsoft.com/office/drawing/2010/main" xmlns="" w="9525">
+                <a14:hiddenLine xmlns="" xmlns:a14="http://schemas.microsoft.com/office/drawing/2010/main" w="9525">
                   <a:solidFill>
                     <a:srgbClr val="000000"/>
                   </a:solidFill>
@@ -2003,7 +2003,7 @@
             </a:ln>
             <a:extLst>
               <a:ext uri="{91240B29-F687-4f45-9708-019B960494DF}">
-                <a14:hiddenLine xmlns:a14="http://schemas.microsoft.com/office/drawing/2010/main" xmlns="" w="9525">
+                <a14:hiddenLine xmlns="" xmlns:a14="http://schemas.microsoft.com/office/drawing/2010/main" w="9525">
                   <a:solidFill>
                     <a:srgbClr val="000000"/>
                   </a:solidFill>
@@ -2071,7 +2071,7 @@
             </a:ln>
             <a:extLst>
               <a:ext uri="{91240B29-F687-4f45-9708-019B960494DF}">
-                <a14:hiddenLine xmlns:a14="http://schemas.microsoft.com/office/drawing/2010/main" xmlns="" w="9525">
+                <a14:hiddenLine xmlns="" xmlns:a14="http://schemas.microsoft.com/office/drawing/2010/main" w="9525">
                   <a:solidFill>
                     <a:srgbClr val="000000"/>
                   </a:solidFill>
@@ -2161,7 +2161,7 @@
             </a:ln>
             <a:extLst>
               <a:ext uri="{91240B29-F687-4f45-9708-019B960494DF}">
-                <a14:hiddenLine xmlns:a14="http://schemas.microsoft.com/office/drawing/2010/main" xmlns="" w="9525">
+                <a14:hiddenLine xmlns="" xmlns:a14="http://schemas.microsoft.com/office/drawing/2010/main" w="9525">
                   <a:solidFill>
                     <a:srgbClr val="000000"/>
                   </a:solidFill>
@@ -2229,7 +2229,7 @@
             </a:ln>
             <a:extLst>
               <a:ext uri="{91240B29-F687-4f45-9708-019B960494DF}">
-                <a14:hiddenLine xmlns:a14="http://schemas.microsoft.com/office/drawing/2010/main" xmlns="" w="9525">
+                <a14:hiddenLine xmlns="" xmlns:a14="http://schemas.microsoft.com/office/drawing/2010/main" w="9525">
                   <a:solidFill>
                     <a:srgbClr val="000000"/>
                   </a:solidFill>
@@ -2319,7 +2319,7 @@
             </a:ln>
             <a:extLst>
               <a:ext uri="{91240B29-F687-4f45-9708-019B960494DF}">
-                <a14:hiddenLine xmlns:a14="http://schemas.microsoft.com/office/drawing/2010/main" xmlns="" w="9525">
+                <a14:hiddenLine xmlns="" xmlns:a14="http://schemas.microsoft.com/office/drawing/2010/main" w="9525">
                   <a:solidFill>
                     <a:srgbClr val="000000"/>
                   </a:solidFill>
@@ -2353,7 +2353,7 @@
             </a:ln>
             <a:extLst>
               <a:ext uri="{91240B29-F687-4f45-9708-019B960494DF}">
-                <a14:hiddenLine xmlns:a14="http://schemas.microsoft.com/office/drawing/2010/main" xmlns="" w="9525">
+                <a14:hiddenLine xmlns="" xmlns:a14="http://schemas.microsoft.com/office/drawing/2010/main" w="9525">
                   <a:solidFill>
                     <a:srgbClr val="000000"/>
                   </a:solidFill>
@@ -2443,7 +2443,7 @@
             </a:ln>
             <a:extLst>
               <a:ext uri="{91240B29-F687-4f45-9708-019B960494DF}">
-                <a14:hiddenLine xmlns:a14="http://schemas.microsoft.com/office/drawing/2010/main" xmlns="" w="9525">
+                <a14:hiddenLine xmlns="" xmlns:a14="http://schemas.microsoft.com/office/drawing/2010/main" w="9525">
                   <a:solidFill>
                     <a:srgbClr val="000000"/>
                   </a:solidFill>
@@ -2505,7 +2505,7 @@
             </a:ln>
             <a:extLst>
               <a:ext uri="{91240B29-F687-4f45-9708-019B960494DF}">
-                <a14:hiddenLine xmlns:a14="http://schemas.microsoft.com/office/drawing/2010/main" xmlns="" w="9525">
+                <a14:hiddenLine xmlns="" xmlns:a14="http://schemas.microsoft.com/office/drawing/2010/main" w="9525">
                   <a:solidFill>
                     <a:srgbClr val="000000"/>
                   </a:solidFill>
@@ -2567,7 +2567,7 @@
             </a:ln>
             <a:extLst>
               <a:ext uri="{91240B29-F687-4f45-9708-019B960494DF}">
-                <a14:hiddenLine xmlns:a14="http://schemas.microsoft.com/office/drawing/2010/main" xmlns="" w="9525">
+                <a14:hiddenLine xmlns="" xmlns:a14="http://schemas.microsoft.com/office/drawing/2010/main" w="9525">
                   <a:solidFill>
                     <a:srgbClr val="000000"/>
                   </a:solidFill>
@@ -2657,7 +2657,7 @@
             </a:ln>
             <a:extLst>
               <a:ext uri="{91240B29-F687-4f45-9708-019B960494DF}">
-                <a14:hiddenLine xmlns:a14="http://schemas.microsoft.com/office/drawing/2010/main" xmlns="" w="9525">
+                <a14:hiddenLine xmlns="" xmlns:a14="http://schemas.microsoft.com/office/drawing/2010/main" w="9525">
                   <a:solidFill>
                     <a:srgbClr val="000000"/>
                   </a:solidFill>
@@ -2725,7 +2725,7 @@
             </a:ln>
             <a:extLst>
               <a:ext uri="{91240B29-F687-4f45-9708-019B960494DF}">
-                <a14:hiddenLine xmlns:a14="http://schemas.microsoft.com/office/drawing/2010/main" xmlns="" w="9525">
+                <a14:hiddenLine xmlns="" xmlns:a14="http://schemas.microsoft.com/office/drawing/2010/main" w="9525">
                   <a:solidFill>
                     <a:srgbClr val="000000"/>
                   </a:solidFill>
@@ -2787,7 +2787,7 @@
             </a:ln>
             <a:extLst>
               <a:ext uri="{91240B29-F687-4f45-9708-019B960494DF}">
-                <a14:hiddenLine xmlns:a14="http://schemas.microsoft.com/office/drawing/2010/main" xmlns="" w="9525">
+                <a14:hiddenLine xmlns="" xmlns:a14="http://schemas.microsoft.com/office/drawing/2010/main" w="9525">
                   <a:solidFill>
                     <a:srgbClr val="000000"/>
                   </a:solidFill>
@@ -2877,7 +2877,7 @@
             </a:ln>
             <a:extLst>
               <a:ext uri="{91240B29-F687-4f45-9708-019B960494DF}">
-                <a14:hiddenLine xmlns:a14="http://schemas.microsoft.com/office/drawing/2010/main" xmlns="" w="9525">
+                <a14:hiddenLine xmlns="" xmlns:a14="http://schemas.microsoft.com/office/drawing/2010/main" w="9525">
                   <a:solidFill>
                     <a:srgbClr val="000000"/>
                   </a:solidFill>
@@ -2939,7 +2939,7 @@
             </a:ln>
             <a:extLst>
               <a:ext uri="{91240B29-F687-4f45-9708-019B960494DF}">
-                <a14:hiddenLine xmlns:a14="http://schemas.microsoft.com/office/drawing/2010/main" xmlns="" w="9525">
+                <a14:hiddenLine xmlns="" xmlns:a14="http://schemas.microsoft.com/office/drawing/2010/main" w="9525">
                   <a:solidFill>
                     <a:srgbClr val="000000"/>
                   </a:solidFill>
@@ -3029,7 +3029,7 @@
             </a:ln>
             <a:extLst>
               <a:ext uri="{91240B29-F687-4f45-9708-019B960494DF}">
-                <a14:hiddenLine xmlns:a14="http://schemas.microsoft.com/office/drawing/2010/main" xmlns="" w="9525">
+                <a14:hiddenLine xmlns="" xmlns:a14="http://schemas.microsoft.com/office/drawing/2010/main" w="9525">
                   <a:solidFill>
                     <a:srgbClr val="000000"/>
                   </a:solidFill>
@@ -3091,7 +3091,7 @@
             </a:ln>
             <a:extLst>
               <a:ext uri="{91240B29-F687-4f45-9708-019B960494DF}">
-                <a14:hiddenLine xmlns:a14="http://schemas.microsoft.com/office/drawing/2010/main" xmlns="" w="9525">
+                <a14:hiddenLine xmlns="" xmlns:a14="http://schemas.microsoft.com/office/drawing/2010/main" w="9525">
                   <a:solidFill>
                     <a:srgbClr val="000000"/>
                   </a:solidFill>
@@ -3181,7 +3181,7 @@
             </a:ln>
             <a:extLst>
               <a:ext uri="{91240B29-F687-4f45-9708-019B960494DF}">
-                <a14:hiddenLine xmlns:a14="http://schemas.microsoft.com/office/drawing/2010/main" xmlns="" w="9525">
+                <a14:hiddenLine xmlns="" xmlns:a14="http://schemas.microsoft.com/office/drawing/2010/main" w="9525">
                   <a:solidFill>
                     <a:srgbClr val="000000"/>
                   </a:solidFill>
@@ -3215,7 +3215,7 @@
             </a:ln>
             <a:extLst>
               <a:ext uri="{91240B29-F687-4f45-9708-019B960494DF}">
-                <a14:hiddenLine xmlns:a14="http://schemas.microsoft.com/office/drawing/2010/main" xmlns="" w="9525">
+                <a14:hiddenLine xmlns="" xmlns:a14="http://schemas.microsoft.com/office/drawing/2010/main" w="9525">
                   <a:solidFill>
                     <a:srgbClr val="000000"/>
                   </a:solidFill>
@@ -3280,7 +3280,7 @@
             </a:ln>
             <a:extLst>
               <a:ext uri="{91240B29-F687-4f45-9708-019B960494DF}">
-                <a14:hiddenLine xmlns:a14="http://schemas.microsoft.com/office/drawing/2010/main" xmlns="" w="9525">
+                <a14:hiddenLine xmlns="" xmlns:a14="http://schemas.microsoft.com/office/drawing/2010/main" w="9525">
                   <a:solidFill>
                     <a:srgbClr val="000000"/>
                   </a:solidFill>
@@ -3370,7 +3370,7 @@
             </a:ln>
             <a:extLst>
               <a:ext uri="{91240B29-F687-4f45-9708-019B960494DF}">
-                <a14:hiddenLine xmlns:a14="http://schemas.microsoft.com/office/drawing/2010/main" xmlns="" w="9525">
+                <a14:hiddenLine xmlns="" xmlns:a14="http://schemas.microsoft.com/office/drawing/2010/main" w="9525">
                   <a:solidFill>
                     <a:srgbClr val="000000"/>
                   </a:solidFill>
@@ -3432,7 +3432,7 @@
             </a:ln>
             <a:extLst>
               <a:ext uri="{91240B29-F687-4f45-9708-019B960494DF}">
-                <a14:hiddenLine xmlns:a14="http://schemas.microsoft.com/office/drawing/2010/main" xmlns="" w="9525">
+                <a14:hiddenLine xmlns="" xmlns:a14="http://schemas.microsoft.com/office/drawing/2010/main" w="9525">
                   <a:solidFill>
                     <a:srgbClr val="000000"/>
                   </a:solidFill>
@@ -3522,7 +3522,7 @@
             </a:ln>
             <a:extLst>
               <a:ext uri="{91240B29-F687-4f45-9708-019B960494DF}">
-                <a14:hiddenLine xmlns:a14="http://schemas.microsoft.com/office/drawing/2010/main" xmlns="" w="9525">
+                <a14:hiddenLine xmlns="" xmlns:a14="http://schemas.microsoft.com/office/drawing/2010/main" w="9525">
                   <a:solidFill>
                     <a:srgbClr val="000000"/>
                   </a:solidFill>
@@ -3612,7 +3612,7 @@
             </a:ln>
             <a:extLst>
               <a:ext uri="{91240B29-F687-4f45-9708-019B960494DF}">
-                <a14:hiddenLine xmlns:a14="http://schemas.microsoft.com/office/drawing/2010/main" xmlns="" w="9525">
+                <a14:hiddenLine xmlns="" xmlns:a14="http://schemas.microsoft.com/office/drawing/2010/main" w="9525">
                   <a:solidFill>
                     <a:srgbClr val="000000"/>
                   </a:solidFill>
@@ -3677,7 +3677,7 @@
             </a:ln>
             <a:extLst>
               <a:ext uri="{91240B29-F687-4f45-9708-019B960494DF}">
-                <a14:hiddenLine xmlns:a14="http://schemas.microsoft.com/office/drawing/2010/main" xmlns="" w="9525">
+                <a14:hiddenLine xmlns="" xmlns:a14="http://schemas.microsoft.com/office/drawing/2010/main" w="9525">
                   <a:solidFill>
                     <a:srgbClr val="000000"/>
                   </a:solidFill>
@@ -3739,7 +3739,7 @@
             </a:ln>
             <a:extLst>
               <a:ext uri="{91240B29-F687-4f45-9708-019B960494DF}">
-                <a14:hiddenLine xmlns:a14="http://schemas.microsoft.com/office/drawing/2010/main" xmlns="" w="9525">
+                <a14:hiddenLine xmlns="" xmlns:a14="http://schemas.microsoft.com/office/drawing/2010/main" w="9525">
                   <a:solidFill>
                     <a:srgbClr val="000000"/>
                   </a:solidFill>
@@ -3829,7 +3829,7 @@
             </a:ln>
             <a:extLst>
               <a:ext uri="{91240B29-F687-4f45-9708-019B960494DF}">
-                <a14:hiddenLine xmlns:a14="http://schemas.microsoft.com/office/drawing/2010/main" xmlns="" w="9525">
+                <a14:hiddenLine xmlns="" xmlns:a14="http://schemas.microsoft.com/office/drawing/2010/main" w="9525">
                   <a:solidFill>
                     <a:srgbClr val="000000"/>
                   </a:solidFill>
@@ -3919,7 +3919,7 @@
             </a:ln>
             <a:extLst>
               <a:ext uri="{91240B29-F687-4f45-9708-019B960494DF}">
-                <a14:hiddenLine xmlns:a14="http://schemas.microsoft.com/office/drawing/2010/main" xmlns="" w="9525">
+                <a14:hiddenLine xmlns="" xmlns:a14="http://schemas.microsoft.com/office/drawing/2010/main" w="9525">
                   <a:solidFill>
                     <a:srgbClr val="000000"/>
                   </a:solidFill>
@@ -3981,7 +3981,7 @@
             </a:ln>
             <a:extLst>
               <a:ext uri="{91240B29-F687-4f45-9708-019B960494DF}">
-                <a14:hiddenLine xmlns:a14="http://schemas.microsoft.com/office/drawing/2010/main" xmlns="" w="9525">
+                <a14:hiddenLine xmlns="" xmlns:a14="http://schemas.microsoft.com/office/drawing/2010/main" w="9525">
                   <a:solidFill>
                     <a:srgbClr val="000000"/>
                   </a:solidFill>
@@ -4101,7 +4101,7 @@
             </a:ln>
             <a:extLst>
               <a:ext uri="{91240B29-F687-4f45-9708-019B960494DF}">
-                <a14:hiddenLine xmlns:a14="http://schemas.microsoft.com/office/drawing/2010/main" xmlns="" w="9525">
+                <a14:hiddenLine xmlns="" xmlns:a14="http://schemas.microsoft.com/office/drawing/2010/main" w="9525">
                   <a:solidFill>
                     <a:srgbClr val="000000"/>
                   </a:solidFill>
@@ -4169,7 +4169,7 @@
             </a:ln>
             <a:extLst>
               <a:ext uri="{91240B29-F687-4f45-9708-019B960494DF}">
-                <a14:hiddenLine xmlns:a14="http://schemas.microsoft.com/office/drawing/2010/main" xmlns="" w="9525">
+                <a14:hiddenLine xmlns="" xmlns:a14="http://schemas.microsoft.com/office/drawing/2010/main" w="9525">
                   <a:solidFill>
                     <a:srgbClr val="000000"/>
                   </a:solidFill>
@@ -4259,7 +4259,7 @@
             </a:ln>
             <a:extLst>
               <a:ext uri="{91240B29-F687-4f45-9708-019B960494DF}">
-                <a14:hiddenLine xmlns:a14="http://schemas.microsoft.com/office/drawing/2010/main" xmlns="" w="9525">
+                <a14:hiddenLine xmlns="" xmlns:a14="http://schemas.microsoft.com/office/drawing/2010/main" w="9525">
                   <a:solidFill>
                     <a:srgbClr val="000000"/>
                   </a:solidFill>
@@ -9066,7 +9066,7 @@
           <a:noFill/>
           <a:extLst>
             <a:ext uri="{909E8E84-426E-40dd-AFC4-6F175D3DCCD1}">
-              <a14:hiddenFill xmlns:a14="http://schemas.microsoft.com/office/drawing/2010/main" xmlns="">
+              <a14:hiddenFill xmlns="" xmlns:a14="http://schemas.microsoft.com/office/drawing/2010/main">
                 <a:solidFill>
                   <a:srgbClr val="FFFFFF"/>
                 </a:solidFill>
@@ -9140,7 +9140,7 @@
               </a:ln>
               <a:extLst>
                 <a:ext uri="{91240B29-F687-4f45-9708-019B960494DF}">
-                  <a14:hiddenLine xmlns:a14="http://schemas.microsoft.com/office/drawing/2010/main" xmlns="" w="9525">
+                  <a14:hiddenLine xmlns="" xmlns:a14="http://schemas.microsoft.com/office/drawing/2010/main" w="9525">
                     <a:solidFill>
                       <a:srgbClr val="000000"/>
                     </a:solidFill>
@@ -9230,7 +9230,7 @@
               </a:ln>
               <a:extLst>
                 <a:ext uri="{91240B29-F687-4f45-9708-019B960494DF}">
-                  <a14:hiddenLine xmlns:a14="http://schemas.microsoft.com/office/drawing/2010/main" xmlns="" w="9525">
+                  <a14:hiddenLine xmlns="" xmlns:a14="http://schemas.microsoft.com/office/drawing/2010/main" w="9525">
                     <a:solidFill>
                       <a:srgbClr val="000000"/>
                     </a:solidFill>
@@ -9320,7 +9320,7 @@
               </a:ln>
               <a:extLst>
                 <a:ext uri="{91240B29-F687-4f45-9708-019B960494DF}">
-                  <a14:hiddenLine xmlns:a14="http://schemas.microsoft.com/office/drawing/2010/main" xmlns="" w="9525">
+                  <a14:hiddenLine xmlns="" xmlns:a14="http://schemas.microsoft.com/office/drawing/2010/main" w="9525">
                     <a:solidFill>
                       <a:srgbClr val="000000"/>
                     </a:solidFill>
@@ -9382,7 +9382,7 @@
               </a:ln>
               <a:extLst>
                 <a:ext uri="{91240B29-F687-4f45-9708-019B960494DF}">
-                  <a14:hiddenLine xmlns:a14="http://schemas.microsoft.com/office/drawing/2010/main" xmlns="" w="9525">
+                  <a14:hiddenLine xmlns="" xmlns:a14="http://schemas.microsoft.com/office/drawing/2010/main" w="9525">
                     <a:solidFill>
                       <a:srgbClr val="000000"/>
                     </a:solidFill>
@@ -9472,7 +9472,7 @@
               </a:ln>
               <a:extLst>
                 <a:ext uri="{91240B29-F687-4f45-9708-019B960494DF}">
-                  <a14:hiddenLine xmlns:a14="http://schemas.microsoft.com/office/drawing/2010/main" xmlns="" w="9525">
+                  <a14:hiddenLine xmlns="" xmlns:a14="http://schemas.microsoft.com/office/drawing/2010/main" w="9525">
                     <a:solidFill>
                       <a:srgbClr val="000000"/>
                     </a:solidFill>
@@ -9534,7 +9534,7 @@
               </a:ln>
               <a:extLst>
                 <a:ext uri="{91240B29-F687-4f45-9708-019B960494DF}">
-                  <a14:hiddenLine xmlns:a14="http://schemas.microsoft.com/office/drawing/2010/main" xmlns="" w="9525">
+                  <a14:hiddenLine xmlns="" xmlns:a14="http://schemas.microsoft.com/office/drawing/2010/main" w="9525">
                     <a:solidFill>
                       <a:srgbClr val="000000"/>
                     </a:solidFill>
@@ -9596,7 +9596,7 @@
               </a:ln>
               <a:extLst>
                 <a:ext uri="{91240B29-F687-4f45-9708-019B960494DF}">
-                  <a14:hiddenLine xmlns:a14="http://schemas.microsoft.com/office/drawing/2010/main" xmlns="" w="9525">
+                  <a14:hiddenLine xmlns="" xmlns:a14="http://schemas.microsoft.com/office/drawing/2010/main" w="9525">
                     <a:solidFill>
                       <a:srgbClr val="000000"/>
                     </a:solidFill>
@@ -9686,7 +9686,7 @@
               </a:ln>
               <a:extLst>
                 <a:ext uri="{91240B29-F687-4f45-9708-019B960494DF}">
-                  <a14:hiddenLine xmlns:a14="http://schemas.microsoft.com/office/drawing/2010/main" xmlns="" w="9525">
+                  <a14:hiddenLine xmlns="" xmlns:a14="http://schemas.microsoft.com/office/drawing/2010/main" w="9525">
                     <a:solidFill>
                       <a:srgbClr val="000000"/>
                     </a:solidFill>
@@ -9776,7 +9776,7 @@
               </a:ln>
               <a:extLst>
                 <a:ext uri="{91240B29-F687-4f45-9708-019B960494DF}">
-                  <a14:hiddenLine xmlns:a14="http://schemas.microsoft.com/office/drawing/2010/main" xmlns="" w="9525">
+                  <a14:hiddenLine xmlns="" xmlns:a14="http://schemas.microsoft.com/office/drawing/2010/main" w="9525">
                     <a:solidFill>
                       <a:srgbClr val="000000"/>
                     </a:solidFill>
@@ -9838,7 +9838,7 @@
               </a:ln>
               <a:extLst>
                 <a:ext uri="{91240B29-F687-4f45-9708-019B960494DF}">
-                  <a14:hiddenLine xmlns:a14="http://schemas.microsoft.com/office/drawing/2010/main" xmlns="" w="9525">
+                  <a14:hiddenLine xmlns="" xmlns:a14="http://schemas.microsoft.com/office/drawing/2010/main" w="9525">
                     <a:solidFill>
                       <a:srgbClr val="000000"/>
                     </a:solidFill>
@@ -9948,7 +9948,7 @@
               </a:ln>
               <a:extLst>
                 <a:ext uri="{91240B29-F687-4f45-9708-019B960494DF}">
-                  <a14:hiddenLine xmlns:a14="http://schemas.microsoft.com/office/drawing/2010/main" xmlns="" w="9525">
+                  <a14:hiddenLine xmlns="" xmlns:a14="http://schemas.microsoft.com/office/drawing/2010/main" w="9525">
                     <a:solidFill>
                       <a:srgbClr val="000000"/>
                     </a:solidFill>
@@ -10032,7 +10032,7 @@
               </a:ln>
               <a:extLst>
                 <a:ext uri="{91240B29-F687-4f45-9708-019B960494DF}">
-                  <a14:hiddenLine xmlns:a14="http://schemas.microsoft.com/office/drawing/2010/main" xmlns="" w="9525">
+                  <a14:hiddenLine xmlns="" xmlns:a14="http://schemas.microsoft.com/office/drawing/2010/main" w="9525">
                     <a:solidFill>
                       <a:srgbClr val="000000"/>
                     </a:solidFill>
@@ -10094,7 +10094,7 @@
               </a:ln>
               <a:extLst>
                 <a:ext uri="{91240B29-F687-4f45-9708-019B960494DF}">
-                  <a14:hiddenLine xmlns:a14="http://schemas.microsoft.com/office/drawing/2010/main" xmlns="" w="9525">
+                  <a14:hiddenLine xmlns="" xmlns:a14="http://schemas.microsoft.com/office/drawing/2010/main" w="9525">
                     <a:solidFill>
                       <a:srgbClr val="000000"/>
                     </a:solidFill>
@@ -10156,7 +10156,7 @@
               </a:ln>
               <a:extLst>
                 <a:ext uri="{91240B29-F687-4f45-9708-019B960494DF}">
-                  <a14:hiddenLine xmlns:a14="http://schemas.microsoft.com/office/drawing/2010/main" xmlns="" w="9525">
+                  <a14:hiddenLine xmlns="" xmlns:a14="http://schemas.microsoft.com/office/drawing/2010/main" w="9525">
                     <a:solidFill>
                       <a:srgbClr val="000000"/>
                     </a:solidFill>
@@ -10246,7 +10246,7 @@
               </a:ln>
               <a:extLst>
                 <a:ext uri="{91240B29-F687-4f45-9708-019B960494DF}">
-                  <a14:hiddenLine xmlns:a14="http://schemas.microsoft.com/office/drawing/2010/main" xmlns="" w="9525">
+                  <a14:hiddenLine xmlns="" xmlns:a14="http://schemas.microsoft.com/office/drawing/2010/main" w="9525">
                     <a:solidFill>
                       <a:srgbClr val="000000"/>
                     </a:solidFill>
@@ -10280,7 +10280,7 @@
               </a:ln>
               <a:extLst>
                 <a:ext uri="{91240B29-F687-4f45-9708-019B960494DF}">
-                  <a14:hiddenLine xmlns:a14="http://schemas.microsoft.com/office/drawing/2010/main" xmlns="" w="9525">
+                  <a14:hiddenLine xmlns="" xmlns:a14="http://schemas.microsoft.com/office/drawing/2010/main" w="9525">
                     <a:solidFill>
                       <a:srgbClr val="000000"/>
                     </a:solidFill>
@@ -10345,7 +10345,7 @@
               </a:ln>
               <a:extLst>
                 <a:ext uri="{91240B29-F687-4f45-9708-019B960494DF}">
-                  <a14:hiddenLine xmlns:a14="http://schemas.microsoft.com/office/drawing/2010/main" xmlns="" w="9525">
+                  <a14:hiddenLine xmlns="" xmlns:a14="http://schemas.microsoft.com/office/drawing/2010/main" w="9525">
                     <a:solidFill>
                       <a:srgbClr val="000000"/>
                     </a:solidFill>
@@ -10435,7 +10435,7 @@
               </a:ln>
               <a:extLst>
                 <a:ext uri="{91240B29-F687-4f45-9708-019B960494DF}">
-                  <a14:hiddenLine xmlns:a14="http://schemas.microsoft.com/office/drawing/2010/main" xmlns="" w="9525">
+                  <a14:hiddenLine xmlns="" xmlns:a14="http://schemas.microsoft.com/office/drawing/2010/main" w="9525">
                     <a:solidFill>
                       <a:srgbClr val="000000"/>
                     </a:solidFill>
@@ -10497,7 +10497,7 @@
               </a:ln>
               <a:extLst>
                 <a:ext uri="{91240B29-F687-4f45-9708-019B960494DF}">
-                  <a14:hiddenLine xmlns:a14="http://schemas.microsoft.com/office/drawing/2010/main" xmlns="" w="9525">
+                  <a14:hiddenLine xmlns="" xmlns:a14="http://schemas.microsoft.com/office/drawing/2010/main" w="9525">
                     <a:solidFill>
                       <a:srgbClr val="000000"/>
                     </a:solidFill>
@@ -10587,7 +10587,7 @@
               </a:ln>
               <a:extLst>
                 <a:ext uri="{91240B29-F687-4f45-9708-019B960494DF}">
-                  <a14:hiddenLine xmlns:a14="http://schemas.microsoft.com/office/drawing/2010/main" xmlns="" w="9525">
+                  <a14:hiddenLine xmlns="" xmlns:a14="http://schemas.microsoft.com/office/drawing/2010/main" w="9525">
                     <a:solidFill>
                       <a:srgbClr val="000000"/>
                     </a:solidFill>
@@ -10652,7 +10652,7 @@
               </a:ln>
               <a:extLst>
                 <a:ext uri="{91240B29-F687-4f45-9708-019B960494DF}">
-                  <a14:hiddenLine xmlns:a14="http://schemas.microsoft.com/office/drawing/2010/main" xmlns="" w="9525">
+                  <a14:hiddenLine xmlns="" xmlns:a14="http://schemas.microsoft.com/office/drawing/2010/main" w="9525">
                     <a:solidFill>
                       <a:srgbClr val="000000"/>
                     </a:solidFill>
@@ -10714,7 +10714,7 @@
               </a:ln>
               <a:extLst>
                 <a:ext uri="{91240B29-F687-4f45-9708-019B960494DF}">
-                  <a14:hiddenLine xmlns:a14="http://schemas.microsoft.com/office/drawing/2010/main" xmlns="" w="9525">
+                  <a14:hiddenLine xmlns="" xmlns:a14="http://schemas.microsoft.com/office/drawing/2010/main" w="9525">
                     <a:solidFill>
                       <a:srgbClr val="000000"/>
                     </a:solidFill>
@@ -10804,7 +10804,7 @@
               </a:ln>
               <a:extLst>
                 <a:ext uri="{91240B29-F687-4f45-9708-019B960494DF}">
-                  <a14:hiddenLine xmlns:a14="http://schemas.microsoft.com/office/drawing/2010/main" xmlns="" w="9525">
+                  <a14:hiddenLine xmlns="" xmlns:a14="http://schemas.microsoft.com/office/drawing/2010/main" w="9525">
                     <a:solidFill>
                       <a:srgbClr val="000000"/>
                     </a:solidFill>
@@ -10894,7 +10894,7 @@
               </a:ln>
               <a:extLst>
                 <a:ext uri="{91240B29-F687-4f45-9708-019B960494DF}">
-                  <a14:hiddenLine xmlns:a14="http://schemas.microsoft.com/office/drawing/2010/main" xmlns="" w="9525">
+                  <a14:hiddenLine xmlns="" xmlns:a14="http://schemas.microsoft.com/office/drawing/2010/main" w="9525">
                     <a:solidFill>
                       <a:srgbClr val="000000"/>
                     </a:solidFill>
@@ -10959,7 +10959,7 @@
               </a:ln>
               <a:extLst>
                 <a:ext uri="{91240B29-F687-4f45-9708-019B960494DF}">
-                  <a14:hiddenLine xmlns:a14="http://schemas.microsoft.com/office/drawing/2010/main" xmlns="" w="9525">
+                  <a14:hiddenLine xmlns="" xmlns:a14="http://schemas.microsoft.com/office/drawing/2010/main" w="9525">
                     <a:solidFill>
                       <a:srgbClr val="000000"/>
                     </a:solidFill>
@@ -11079,7 +11079,7 @@
               </a:ln>
               <a:extLst>
                 <a:ext uri="{91240B29-F687-4f45-9708-019B960494DF}">
-                  <a14:hiddenLine xmlns:a14="http://schemas.microsoft.com/office/drawing/2010/main" xmlns="" w="9525">
+                  <a14:hiddenLine xmlns="" xmlns:a14="http://schemas.microsoft.com/office/drawing/2010/main" w="9525">
                     <a:solidFill>
                       <a:srgbClr val="000000"/>
                     </a:solidFill>
@@ -11177,7 +11177,7 @@
               </a:ln>
               <a:extLst>
                 <a:ext uri="{91240B29-F687-4f45-9708-019B960494DF}">
-                  <a14:hiddenLine xmlns:a14="http://schemas.microsoft.com/office/drawing/2010/main" xmlns="" w="9525">
+                  <a14:hiddenLine xmlns="" xmlns:a14="http://schemas.microsoft.com/office/drawing/2010/main" w="9525">
                     <a:solidFill>
                       <a:srgbClr val="000000"/>
                     </a:solidFill>
@@ -11292,7 +11292,7 @@
               </a:ln>
               <a:extLst>
                 <a:ext uri="{91240B29-F687-4f45-9708-019B960494DF}">
-                  <a14:hiddenLine xmlns:a14="http://schemas.microsoft.com/office/drawing/2010/main" xmlns="" w="9525">
+                  <a14:hiddenLine xmlns="" xmlns:a14="http://schemas.microsoft.com/office/drawing/2010/main" w="9525">
                     <a:solidFill>
                       <a:srgbClr val="000000"/>
                     </a:solidFill>
@@ -11382,7 +11382,7 @@
               </a:ln>
               <a:extLst>
                 <a:ext uri="{91240B29-F687-4f45-9708-019B960494DF}">
-                  <a14:hiddenLine xmlns:a14="http://schemas.microsoft.com/office/drawing/2010/main" xmlns="" w="9525">
+                  <a14:hiddenLine xmlns="" xmlns:a14="http://schemas.microsoft.com/office/drawing/2010/main" w="9525">
                     <a:solidFill>
                       <a:srgbClr val="000000"/>
                     </a:solidFill>
@@ -11447,7 +11447,7 @@
               </a:ln>
               <a:extLst>
                 <a:ext uri="{91240B29-F687-4f45-9708-019B960494DF}">
-                  <a14:hiddenLine xmlns:a14="http://schemas.microsoft.com/office/drawing/2010/main" xmlns="" w="9525">
+                  <a14:hiddenLine xmlns="" xmlns:a14="http://schemas.microsoft.com/office/drawing/2010/main" w="9525">
                     <a:solidFill>
                       <a:srgbClr val="000000"/>
                     </a:solidFill>
@@ -11537,7 +11537,7 @@
               </a:ln>
               <a:extLst>
                 <a:ext uri="{91240B29-F687-4f45-9708-019B960494DF}">
-                  <a14:hiddenLine xmlns:a14="http://schemas.microsoft.com/office/drawing/2010/main" xmlns="" w="9525">
+                  <a14:hiddenLine xmlns="" xmlns:a14="http://schemas.microsoft.com/office/drawing/2010/main" w="9525">
                     <a:solidFill>
                       <a:srgbClr val="000000"/>
                     </a:solidFill>
@@ -11605,7 +11605,7 @@
               </a:ln>
               <a:extLst>
                 <a:ext uri="{91240B29-F687-4f45-9708-019B960494DF}">
-                  <a14:hiddenLine xmlns:a14="http://schemas.microsoft.com/office/drawing/2010/main" xmlns="" w="9525">
+                  <a14:hiddenLine xmlns="" xmlns:a14="http://schemas.microsoft.com/office/drawing/2010/main" w="9525">
                     <a:solidFill>
                       <a:srgbClr val="000000"/>
                     </a:solidFill>
@@ -11695,7 +11695,7 @@
               </a:ln>
               <a:extLst>
                 <a:ext uri="{91240B29-F687-4f45-9708-019B960494DF}">
-                  <a14:hiddenLine xmlns:a14="http://schemas.microsoft.com/office/drawing/2010/main" xmlns="" w="9525">
+                  <a14:hiddenLine xmlns="" xmlns:a14="http://schemas.microsoft.com/office/drawing/2010/main" w="9525">
                     <a:solidFill>
                       <a:srgbClr val="000000"/>
                     </a:solidFill>
@@ -11763,7 +11763,7 @@
               </a:ln>
               <a:extLst>
                 <a:ext uri="{91240B29-F687-4f45-9708-019B960494DF}">
-                  <a14:hiddenLine xmlns:a14="http://schemas.microsoft.com/office/drawing/2010/main" xmlns="" w="9525">
+                  <a14:hiddenLine xmlns="" xmlns:a14="http://schemas.microsoft.com/office/drawing/2010/main" w="9525">
                     <a:solidFill>
                       <a:srgbClr val="000000"/>
                     </a:solidFill>
@@ -11853,7 +11853,7 @@
               </a:ln>
               <a:extLst>
                 <a:ext uri="{91240B29-F687-4f45-9708-019B960494DF}">
-                  <a14:hiddenLine xmlns:a14="http://schemas.microsoft.com/office/drawing/2010/main" xmlns="" w="9525">
+                  <a14:hiddenLine xmlns="" xmlns:a14="http://schemas.microsoft.com/office/drawing/2010/main" w="9525">
                     <a:solidFill>
                       <a:srgbClr val="000000"/>
                     </a:solidFill>
@@ -11887,7 +11887,7 @@
               </a:ln>
               <a:extLst>
                 <a:ext uri="{91240B29-F687-4f45-9708-019B960494DF}">
-                  <a14:hiddenLine xmlns:a14="http://schemas.microsoft.com/office/drawing/2010/main" xmlns="" w="9525">
+                  <a14:hiddenLine xmlns="" xmlns:a14="http://schemas.microsoft.com/office/drawing/2010/main" w="9525">
                     <a:solidFill>
                       <a:srgbClr val="000000"/>
                     </a:solidFill>
@@ -12698,66 +12698,41 @@
           <a:chExt cx="0" cy="0"/>
         </a:xfrm>
       </p:grpSpPr>
-      <p:sp>
-        <p:nvSpPr>
-          <p:cNvPr id="2" name="Title 1">
+      <p:pic>
+        <p:nvPicPr>
+          <p:cNvPr id="7" name="Content Placeholder 6">
             <a:extLst>
               <a:ext uri="{FF2B5EF4-FFF2-40B4-BE49-F238E27FC236}">
-                <a16:creationId xmlns:a16="http://schemas.microsoft.com/office/drawing/2014/main" id="{D2A3AD0B-6853-4906-B1D5-80614E47CBD6}"/>
+                <a16:creationId xmlns:a16="http://schemas.microsoft.com/office/drawing/2014/main" id="{E96E33CB-6991-4DC3-A7D9-373DA45B9BB2}"/>
               </a:ext>
             </a:extLst>
           </p:cNvPr>
-          <p:cNvSpPr>
-            <a:spLocks noGrp="1"/>
-          </p:cNvSpPr>
-          <p:nvPr>
-            <p:ph type="title"/>
-          </p:nvPr>
-        </p:nvSpPr>
-        <p:spPr/>
-        <p:txBody>
-          <a:bodyPr/>
-          <a:lstStyle/>
-          <a:p>
-            <a:r>
-              <a:rPr lang="en-CA" dirty="0"/>
-              <a:t>Idea Sheet 1</a:t>
-            </a:r>
-          </a:p>
-        </p:txBody>
-      </p:sp>
-      <p:sp>
-        <p:nvSpPr>
-          <p:cNvPr id="3" name="Content Placeholder 2">
-            <a:extLst>
-              <a:ext uri="{FF2B5EF4-FFF2-40B4-BE49-F238E27FC236}">
-                <a16:creationId xmlns:a16="http://schemas.microsoft.com/office/drawing/2014/main" id="{FFA94684-1319-4870-B7AD-211B15A4BB24}"/>
-              </a:ext>
-            </a:extLst>
-          </p:cNvPr>
-          <p:cNvSpPr>
-            <a:spLocks noGrp="1"/>
-          </p:cNvSpPr>
+          <p:cNvPicPr>
+            <a:picLocks noGrp="1" noChangeAspect="1"/>
+          </p:cNvPicPr>
           <p:nvPr>
             <p:ph idx="1"/>
           </p:nvPr>
-        </p:nvSpPr>
-        <p:spPr/>
-        <p:txBody>
-          <a:bodyPr/>
-          <a:lstStyle/>
-          <a:p>
-            <a:r>
-              <a:rPr lang="en-US" altLang="en-US" dirty="0"/>
-              <a:t>Describe your idea sheets and any categories/themes that emerged</a:t>
-            </a:r>
-            <a:endParaRPr lang="en-CA" altLang="en-US" dirty="0"/>
-          </a:p>
-          <a:p>
-            <a:endParaRPr lang="en-CA" dirty="0"/>
-          </a:p>
-        </p:txBody>
-      </p:sp>
+        </p:nvPicPr>
+        <p:blipFill>
+          <a:blip r:embed="rId2">
+            <a:extLst>
+              <a:ext uri="{28A0092B-C50C-407E-A947-70E740481C1C}">
+                <a14:useLocalDpi xmlns:a14="http://schemas.microsoft.com/office/drawing/2010/main" val="0"/>
+              </a:ext>
+            </a:extLst>
+          </a:blip>
+          <a:stretch>
+            <a:fillRect/>
+          </a:stretch>
+        </p:blipFill>
+        <p:spPr>
+          <a:xfrm rot="16200000">
+            <a:off x="2661684" y="-1010093"/>
+            <a:ext cx="6868631" cy="8888817"/>
+          </a:xfrm>
+        </p:spPr>
+      </p:pic>
     </p:spTree>
     <p:extLst>
       <p:ext uri="{BB962C8B-B14F-4D97-AF65-F5344CB8AC3E}">
@@ -12788,59 +12763,42 @@
           <a:chExt cx="0" cy="0"/>
         </a:xfrm>
       </p:grpSpPr>
-      <p:sp>
-        <p:nvSpPr>
-          <p:cNvPr id="2" name="Title 1">
+      <p:pic>
+        <p:nvPicPr>
+          <p:cNvPr id="7" name="Picture 6">
             <a:extLst>
               <a:ext uri="{FF2B5EF4-FFF2-40B4-BE49-F238E27FC236}">
-                <a16:creationId xmlns:a16="http://schemas.microsoft.com/office/drawing/2014/main" id="{DDEE1308-015A-47E3-BE3B-280917DDCF20}"/>
+                <a16:creationId xmlns:a16="http://schemas.microsoft.com/office/drawing/2014/main" id="{35A7DD49-7445-41CD-BC75-B374F23EC472}"/>
               </a:ext>
             </a:extLst>
           </p:cNvPr>
-          <p:cNvSpPr>
-            <a:spLocks noGrp="1"/>
-          </p:cNvSpPr>
-          <p:nvPr>
-            <p:ph type="title"/>
-          </p:nvPr>
-        </p:nvSpPr>
-        <p:spPr/>
-        <p:txBody>
-          <a:bodyPr/>
-          <a:lstStyle/>
-          <a:p>
-            <a:r>
-              <a:rPr lang="en-CA" dirty="0"/>
-              <a:t>Idea Sheet 2</a:t>
-            </a:r>
-          </a:p>
-        </p:txBody>
-      </p:sp>
-      <p:sp>
-        <p:nvSpPr>
-          <p:cNvPr id="3" name="Content Placeholder 2">
+          <p:cNvPicPr>
+            <a:picLocks noChangeAspect="1"/>
+          </p:cNvPicPr>
+          <p:nvPr/>
+        </p:nvPicPr>
+        <p:blipFill>
+          <a:blip r:embed="rId2">
             <a:extLst>
-              <a:ext uri="{FF2B5EF4-FFF2-40B4-BE49-F238E27FC236}">
-                <a16:creationId xmlns:a16="http://schemas.microsoft.com/office/drawing/2014/main" id="{B1287823-76CA-46F0-9361-92583FE4C26B}"/>
+              <a:ext uri="{28A0092B-C50C-407E-A947-70E740481C1C}">
+                <a14:useLocalDpi xmlns:a14="http://schemas.microsoft.com/office/drawing/2010/main" val="0"/>
               </a:ext>
             </a:extLst>
-          </p:cNvPr>
-          <p:cNvSpPr>
-            <a:spLocks noGrp="1"/>
-          </p:cNvSpPr>
-          <p:nvPr>
-            <p:ph idx="1"/>
-          </p:nvPr>
-        </p:nvSpPr>
-        <p:spPr/>
-        <p:txBody>
-          <a:bodyPr/>
-          <a:lstStyle/>
-          <a:p>
-            <a:endParaRPr lang="en-CA"/>
-          </a:p>
-        </p:txBody>
-      </p:sp>
+          </a:blip>
+          <a:stretch>
+            <a:fillRect/>
+          </a:stretch>
+        </p:blipFill>
+        <p:spPr>
+          <a:xfrm rot="16200000">
+            <a:off x="2667000" y="-1008529"/>
+            <a:ext cx="6857999" cy="8875058"/>
+          </a:xfrm>
+          <a:prstGeom prst="rect">
+            <a:avLst/>
+          </a:prstGeom>
+        </p:spPr>
+      </p:pic>
     </p:spTree>
     <p:extLst>
       <p:ext uri="{BB962C8B-B14F-4D97-AF65-F5344CB8AC3E}">
@@ -12871,59 +12829,42 @@
           <a:chExt cx="0" cy="0"/>
         </a:xfrm>
       </p:grpSpPr>
-      <p:sp>
-        <p:nvSpPr>
-          <p:cNvPr id="2" name="Title 1">
+      <p:pic>
+        <p:nvPicPr>
+          <p:cNvPr id="7" name="Picture 6">
             <a:extLst>
               <a:ext uri="{FF2B5EF4-FFF2-40B4-BE49-F238E27FC236}">
-                <a16:creationId xmlns:a16="http://schemas.microsoft.com/office/drawing/2014/main" id="{83727932-7442-408A-8632-82934182B1E0}"/>
+                <a16:creationId xmlns:a16="http://schemas.microsoft.com/office/drawing/2014/main" id="{FBF0E0AF-B7FE-4E66-B52A-D00FF6103627}"/>
               </a:ext>
             </a:extLst>
           </p:cNvPr>
-          <p:cNvSpPr>
-            <a:spLocks noGrp="1"/>
-          </p:cNvSpPr>
-          <p:nvPr>
-            <p:ph type="title"/>
-          </p:nvPr>
-        </p:nvSpPr>
-        <p:spPr/>
-        <p:txBody>
-          <a:bodyPr/>
-          <a:lstStyle/>
-          <a:p>
-            <a:r>
-              <a:rPr lang="en-CA" dirty="0"/>
-              <a:t>Idea sheet 3</a:t>
-            </a:r>
-          </a:p>
-        </p:txBody>
-      </p:sp>
-      <p:sp>
-        <p:nvSpPr>
-          <p:cNvPr id="3" name="Content Placeholder 2">
+          <p:cNvPicPr>
+            <a:picLocks noChangeAspect="1"/>
+          </p:cNvPicPr>
+          <p:nvPr/>
+        </p:nvPicPr>
+        <p:blipFill>
+          <a:blip r:embed="rId2">
             <a:extLst>
-              <a:ext uri="{FF2B5EF4-FFF2-40B4-BE49-F238E27FC236}">
-                <a16:creationId xmlns:a16="http://schemas.microsoft.com/office/drawing/2014/main" id="{E3C62968-80CB-4348-862D-1F9F1DD7D112}"/>
+              <a:ext uri="{28A0092B-C50C-407E-A947-70E740481C1C}">
+                <a14:useLocalDpi xmlns:a14="http://schemas.microsoft.com/office/drawing/2010/main" val="0"/>
               </a:ext>
             </a:extLst>
-          </p:cNvPr>
-          <p:cNvSpPr>
-            <a:spLocks noGrp="1"/>
-          </p:cNvSpPr>
-          <p:nvPr>
-            <p:ph idx="1"/>
-          </p:nvPr>
-        </p:nvSpPr>
-        <p:spPr/>
-        <p:txBody>
-          <a:bodyPr/>
-          <a:lstStyle/>
-          <a:p>
-            <a:endParaRPr lang="en-CA"/>
-          </a:p>
-        </p:txBody>
-      </p:sp>
+          </a:blip>
+          <a:stretch>
+            <a:fillRect/>
+          </a:stretch>
+        </p:blipFill>
+        <p:spPr>
+          <a:xfrm rot="16200000">
+            <a:off x="2667000" y="-1008529"/>
+            <a:ext cx="6857999" cy="8875058"/>
+          </a:xfrm>
+          <a:prstGeom prst="rect">
+            <a:avLst/>
+          </a:prstGeom>
+        </p:spPr>
+      </p:pic>
     </p:spTree>
     <p:extLst>
       <p:ext uri="{BB962C8B-B14F-4D97-AF65-F5344CB8AC3E}">
@@ -12954,59 +12895,42 @@
           <a:chExt cx="0" cy="0"/>
         </a:xfrm>
       </p:grpSpPr>
-      <p:sp>
-        <p:nvSpPr>
-          <p:cNvPr id="2" name="Title 1">
+      <p:pic>
+        <p:nvPicPr>
+          <p:cNvPr id="7" name="Picture 6">
             <a:extLst>
               <a:ext uri="{FF2B5EF4-FFF2-40B4-BE49-F238E27FC236}">
-                <a16:creationId xmlns:a16="http://schemas.microsoft.com/office/drawing/2014/main" id="{789CED17-FDDE-42DC-B976-E74ECF1B4201}"/>
+                <a16:creationId xmlns:a16="http://schemas.microsoft.com/office/drawing/2014/main" id="{8E74BC84-1F55-41CD-AF76-CCF1087A6A16}"/>
               </a:ext>
             </a:extLst>
           </p:cNvPr>
-          <p:cNvSpPr>
-            <a:spLocks noGrp="1"/>
-          </p:cNvSpPr>
-          <p:nvPr>
-            <p:ph type="title"/>
-          </p:nvPr>
-        </p:nvSpPr>
-        <p:spPr/>
-        <p:txBody>
-          <a:bodyPr/>
-          <a:lstStyle/>
-          <a:p>
-            <a:r>
-              <a:rPr lang="en-CA" dirty="0"/>
-              <a:t>Idea sheet 4</a:t>
-            </a:r>
-          </a:p>
-        </p:txBody>
-      </p:sp>
-      <p:sp>
-        <p:nvSpPr>
-          <p:cNvPr id="3" name="Content Placeholder 2">
+          <p:cNvPicPr>
+            <a:picLocks noChangeAspect="1"/>
+          </p:cNvPicPr>
+          <p:nvPr/>
+        </p:nvPicPr>
+        <p:blipFill>
+          <a:blip r:embed="rId2">
             <a:extLst>
-              <a:ext uri="{FF2B5EF4-FFF2-40B4-BE49-F238E27FC236}">
-                <a16:creationId xmlns:a16="http://schemas.microsoft.com/office/drawing/2014/main" id="{CEAD1E07-DCDD-4C9D-AF4F-0FA36322BE5B}"/>
+              <a:ext uri="{28A0092B-C50C-407E-A947-70E740481C1C}">
+                <a14:useLocalDpi xmlns:a14="http://schemas.microsoft.com/office/drawing/2010/main" val="0"/>
               </a:ext>
             </a:extLst>
-          </p:cNvPr>
-          <p:cNvSpPr>
-            <a:spLocks noGrp="1"/>
-          </p:cNvSpPr>
-          <p:nvPr>
-            <p:ph idx="1"/>
-          </p:nvPr>
-        </p:nvSpPr>
-        <p:spPr/>
-        <p:txBody>
-          <a:bodyPr/>
-          <a:lstStyle/>
-          <a:p>
-            <a:endParaRPr lang="en-CA"/>
-          </a:p>
-        </p:txBody>
-      </p:sp>
+          </a:blip>
+          <a:stretch>
+            <a:fillRect/>
+          </a:stretch>
+        </p:blipFill>
+        <p:spPr>
+          <a:xfrm rot="16200000">
+            <a:off x="2667000" y="-1008529"/>
+            <a:ext cx="6857999" cy="8875058"/>
+          </a:xfrm>
+          <a:prstGeom prst="rect">
+            <a:avLst/>
+          </a:prstGeom>
+        </p:spPr>
+      </p:pic>
     </p:spTree>
     <p:extLst>
       <p:ext uri="{BB962C8B-B14F-4D97-AF65-F5344CB8AC3E}">
@@ -13021,8 +12945,16 @@
 </file>
 
 <file path=ppt/slides/slide7.xml><?xml version="1.0" encoding="utf-8"?>
-<p:sld xmlns:a="http://schemas.openxmlformats.org/drawingml/2006/main" xmlns:r="http://schemas.openxmlformats.org/officeDocument/2006/relationships" xmlns:p="http://schemas.openxmlformats.org/presentationml/2006/main">
+<p:sld xmlns:a="http://schemas.openxmlformats.org/drawingml/2006/main" xmlns:r="http://schemas.openxmlformats.org/officeDocument/2006/relationships" xmlns:p="http://schemas.openxmlformats.org/presentationml/2006/main" showMasterSp="0">
   <p:cSld>
+    <p:bg>
+      <p:bgPr>
+        <a:solidFill>
+          <a:schemeClr val="tx1"/>
+        </a:solidFill>
+        <a:effectLst/>
+      </p:bgPr>
+    </p:bg>
     <p:spTree>
       <p:nvGrpSpPr>
         <p:cNvPr id="1" name=""/>
@@ -13053,63 +12985,68 @@
             <p:ph type="title"/>
           </p:nvPr>
         </p:nvSpPr>
-        <p:spPr/>
+        <p:spPr>
+          <a:xfrm>
+            <a:off x="1240650" y="0"/>
+            <a:ext cx="9905998" cy="643972"/>
+          </a:xfrm>
+        </p:spPr>
         <p:txBody>
           <a:bodyPr/>
           <a:lstStyle/>
           <a:p>
             <a:r>
-              <a:rPr lang="en-US" altLang="en-US" dirty="0"/>
+              <a:rPr lang="en-US" altLang="en-US" dirty="0">
+                <a:solidFill>
+                  <a:schemeClr val="bg1"/>
+                </a:solidFill>
+              </a:rPr>
               <a:t>Future state VSM</a:t>
             </a:r>
-            <a:endParaRPr lang="en-CA" dirty="0"/>
+            <a:endParaRPr lang="en-CA" dirty="0">
+              <a:solidFill>
+                <a:schemeClr val="bg1"/>
+              </a:solidFill>
+            </a:endParaRPr>
           </a:p>
         </p:txBody>
       </p:sp>
-      <p:sp>
-        <p:nvSpPr>
-          <p:cNvPr id="3" name="Content Placeholder 2">
+      <p:pic>
+        <p:nvPicPr>
+          <p:cNvPr id="5" name="Picture 4">
             <a:extLst>
               <a:ext uri="{FF2B5EF4-FFF2-40B4-BE49-F238E27FC236}">
-                <a16:creationId xmlns:a16="http://schemas.microsoft.com/office/drawing/2014/main" id="{5E8A01EB-2E55-4294-B6AB-BA9FE4AE1E94}"/>
+                <a16:creationId xmlns:a16="http://schemas.microsoft.com/office/drawing/2014/main" id="{24A9E6B8-A64B-4D99-8D5C-1A897A16A3D4}"/>
               </a:ext>
             </a:extLst>
           </p:cNvPr>
-          <p:cNvSpPr>
-            <a:spLocks noGrp="1"/>
-          </p:cNvSpPr>
-          <p:nvPr>
-            <p:ph idx="1"/>
-          </p:nvPr>
-        </p:nvSpPr>
-        <p:spPr/>
-        <p:txBody>
-          <a:bodyPr/>
-          <a:lstStyle/>
-          <a:p>
-            <a:r>
-              <a:rPr lang="en-US" altLang="en-US" dirty="0"/>
-              <a:t>Display your completed future state VSM</a:t>
-            </a:r>
-          </a:p>
-          <a:p>
-            <a:r>
-              <a:rPr lang="en-US" altLang="en-US" dirty="0"/>
-              <a:t>Emphasize the differences from the current state VSM</a:t>
-            </a:r>
-          </a:p>
-          <a:p>
-            <a:r>
-              <a:rPr lang="en-US" altLang="en-US" dirty="0"/>
-              <a:t>Share reasons for choosing areas to improve</a:t>
-            </a:r>
-            <a:endParaRPr lang="en-CA" altLang="en-US" dirty="0"/>
-          </a:p>
-          <a:p>
-            <a:endParaRPr lang="en-CA" dirty="0"/>
-          </a:p>
-        </p:txBody>
-      </p:sp>
+          <p:cNvPicPr>
+            <a:picLocks noChangeAspect="1"/>
+          </p:cNvPicPr>
+          <p:nvPr/>
+        </p:nvPicPr>
+        <p:blipFill>
+          <a:blip r:embed="rId2">
+            <a:extLst>
+              <a:ext uri="{28A0092B-C50C-407E-A947-70E740481C1C}">
+                <a14:useLocalDpi xmlns:a14="http://schemas.microsoft.com/office/drawing/2010/main" val="0"/>
+              </a:ext>
+            </a:extLst>
+          </a:blip>
+          <a:stretch>
+            <a:fillRect/>
+          </a:stretch>
+        </p:blipFill>
+        <p:spPr>
+          <a:xfrm>
+            <a:off x="0" y="590286"/>
+            <a:ext cx="12192000" cy="6060199"/>
+          </a:xfrm>
+          <a:prstGeom prst="rect">
+            <a:avLst/>
+          </a:prstGeom>
+        </p:spPr>
+      </p:pic>
     </p:spTree>
     <p:extLst>
       <p:ext uri="{BB962C8B-B14F-4D97-AF65-F5344CB8AC3E}">

</xml_diff>

<commit_message>
Update: improved group reflection slide
</commit_message>
<xml_diff>
--- a/Milestone 2/ENSE 470 Milestone 2.pptx
+++ b/Milestone 2/ENSE 470 Milestone 2.pptx
@@ -173,7 +173,7 @@
           <a:noFill/>
           <a:extLst>
             <a:ext uri="{909E8E84-426E-40dd-AFC4-6F175D3DCCD1}">
-              <a14:hiddenFill xmlns="" xmlns:a14="http://schemas.microsoft.com/office/drawing/2010/main">
+              <a14:hiddenFill xmlns:a14="http://schemas.microsoft.com/office/drawing/2010/main" xmlns="">
                 <a:solidFill>
                   <a:srgbClr val="FFFFFF"/>
                 </a:solidFill>
@@ -233,7 +233,7 @@
             </a:ln>
             <a:extLst>
               <a:ext uri="{91240B29-F687-4f45-9708-019B960494DF}">
-                <a14:hiddenLine xmlns="" xmlns:a14="http://schemas.microsoft.com/office/drawing/2010/main" w="9525">
+                <a14:hiddenLine xmlns:a14="http://schemas.microsoft.com/office/drawing/2010/main" xmlns="" w="9525">
                   <a:solidFill>
                     <a:srgbClr val="000000"/>
                   </a:solidFill>
@@ -323,7 +323,7 @@
             </a:ln>
             <a:extLst>
               <a:ext uri="{91240B29-F687-4f45-9708-019B960494DF}">
-                <a14:hiddenLine xmlns="" xmlns:a14="http://schemas.microsoft.com/office/drawing/2010/main" w="9525">
+                <a14:hiddenLine xmlns:a14="http://schemas.microsoft.com/office/drawing/2010/main" xmlns="" w="9525">
                   <a:solidFill>
                     <a:srgbClr val="000000"/>
                   </a:solidFill>
@@ -413,7 +413,7 @@
             </a:ln>
             <a:extLst>
               <a:ext uri="{91240B29-F687-4f45-9708-019B960494DF}">
-                <a14:hiddenLine xmlns="" xmlns:a14="http://schemas.microsoft.com/office/drawing/2010/main" w="9525">
+                <a14:hiddenLine xmlns:a14="http://schemas.microsoft.com/office/drawing/2010/main" xmlns="" w="9525">
                   <a:solidFill>
                     <a:srgbClr val="000000"/>
                   </a:solidFill>
@@ -447,7 +447,7 @@
             </a:ln>
             <a:extLst>
               <a:ext uri="{91240B29-F687-4f45-9708-019B960494DF}">
-                <a14:hiddenLine xmlns="" xmlns:a14="http://schemas.microsoft.com/office/drawing/2010/main" w="9525">
+                <a14:hiddenLine xmlns:a14="http://schemas.microsoft.com/office/drawing/2010/main" xmlns="" w="9525">
                   <a:solidFill>
                     <a:srgbClr val="000000"/>
                   </a:solidFill>
@@ -537,7 +537,7 @@
             </a:ln>
             <a:extLst>
               <a:ext uri="{91240B29-F687-4f45-9708-019B960494DF}">
-                <a14:hiddenLine xmlns="" xmlns:a14="http://schemas.microsoft.com/office/drawing/2010/main" w="9525">
+                <a14:hiddenLine xmlns:a14="http://schemas.microsoft.com/office/drawing/2010/main" xmlns="" w="9525">
                   <a:solidFill>
                     <a:srgbClr val="000000"/>
                   </a:solidFill>
@@ -599,7 +599,7 @@
             </a:ln>
             <a:extLst>
               <a:ext uri="{91240B29-F687-4f45-9708-019B960494DF}">
-                <a14:hiddenLine xmlns="" xmlns:a14="http://schemas.microsoft.com/office/drawing/2010/main" w="9525">
+                <a14:hiddenLine xmlns:a14="http://schemas.microsoft.com/office/drawing/2010/main" xmlns="" w="9525">
                   <a:solidFill>
                     <a:srgbClr val="000000"/>
                   </a:solidFill>
@@ -661,7 +661,7 @@
             </a:ln>
             <a:extLst>
               <a:ext uri="{91240B29-F687-4f45-9708-019B960494DF}">
-                <a14:hiddenLine xmlns="" xmlns:a14="http://schemas.microsoft.com/office/drawing/2010/main" w="9525">
+                <a14:hiddenLine xmlns:a14="http://schemas.microsoft.com/office/drawing/2010/main" xmlns="" w="9525">
                   <a:solidFill>
                     <a:srgbClr val="000000"/>
                   </a:solidFill>
@@ -751,7 +751,7 @@
             </a:ln>
             <a:extLst>
               <a:ext uri="{91240B29-F687-4f45-9708-019B960494DF}">
-                <a14:hiddenLine xmlns="" xmlns:a14="http://schemas.microsoft.com/office/drawing/2010/main" w="9525">
+                <a14:hiddenLine xmlns:a14="http://schemas.microsoft.com/office/drawing/2010/main" xmlns="" w="9525">
                   <a:solidFill>
                     <a:srgbClr val="000000"/>
                   </a:solidFill>
@@ -813,7 +813,7 @@
             </a:ln>
             <a:extLst>
               <a:ext uri="{91240B29-F687-4f45-9708-019B960494DF}">
-                <a14:hiddenLine xmlns="" xmlns:a14="http://schemas.microsoft.com/office/drawing/2010/main" w="9525">
+                <a14:hiddenLine xmlns:a14="http://schemas.microsoft.com/office/drawing/2010/main" xmlns="" w="9525">
                   <a:solidFill>
                     <a:srgbClr val="000000"/>
                   </a:solidFill>
@@ -875,7 +875,7 @@
             </a:ln>
             <a:extLst>
               <a:ext uri="{91240B29-F687-4f45-9708-019B960494DF}">
-                <a14:hiddenLine xmlns="" xmlns:a14="http://schemas.microsoft.com/office/drawing/2010/main" w="9525">
+                <a14:hiddenLine xmlns:a14="http://schemas.microsoft.com/office/drawing/2010/main" xmlns="" w="9525">
                   <a:solidFill>
                     <a:srgbClr val="000000"/>
                   </a:solidFill>
@@ -965,7 +965,7 @@
             </a:ln>
             <a:extLst>
               <a:ext uri="{91240B29-F687-4f45-9708-019B960494DF}">
-                <a14:hiddenLine xmlns="" xmlns:a14="http://schemas.microsoft.com/office/drawing/2010/main" w="9525">
+                <a14:hiddenLine xmlns:a14="http://schemas.microsoft.com/office/drawing/2010/main" xmlns="" w="9525">
                   <a:solidFill>
                     <a:srgbClr val="000000"/>
                   </a:solidFill>
@@ -1055,7 +1055,7 @@
             </a:ln>
             <a:extLst>
               <a:ext uri="{91240B29-F687-4f45-9708-019B960494DF}">
-                <a14:hiddenLine xmlns="" xmlns:a14="http://schemas.microsoft.com/office/drawing/2010/main" w="9525">
+                <a14:hiddenLine xmlns:a14="http://schemas.microsoft.com/office/drawing/2010/main" xmlns="" w="9525">
                   <a:solidFill>
                     <a:srgbClr val="000000"/>
                   </a:solidFill>
@@ -1117,7 +1117,7 @@
             </a:ln>
             <a:extLst>
               <a:ext uri="{91240B29-F687-4f45-9708-019B960494DF}">
-                <a14:hiddenLine xmlns="" xmlns:a14="http://schemas.microsoft.com/office/drawing/2010/main" w="9525">
+                <a14:hiddenLine xmlns:a14="http://schemas.microsoft.com/office/drawing/2010/main" xmlns="" w="9525">
                   <a:solidFill>
                     <a:srgbClr val="000000"/>
                   </a:solidFill>
@@ -1227,7 +1227,7 @@
             </a:ln>
             <a:extLst>
               <a:ext uri="{91240B29-F687-4f45-9708-019B960494DF}">
-                <a14:hiddenLine xmlns="" xmlns:a14="http://schemas.microsoft.com/office/drawing/2010/main" w="9525">
+                <a14:hiddenLine xmlns:a14="http://schemas.microsoft.com/office/drawing/2010/main" xmlns="" w="9525">
                   <a:solidFill>
                     <a:srgbClr val="000000"/>
                   </a:solidFill>
@@ -1289,7 +1289,7 @@
             </a:ln>
             <a:extLst>
               <a:ext uri="{91240B29-F687-4f45-9708-019B960494DF}">
-                <a14:hiddenLine xmlns="" xmlns:a14="http://schemas.microsoft.com/office/drawing/2010/main" w="9525">
+                <a14:hiddenLine xmlns:a14="http://schemas.microsoft.com/office/drawing/2010/main" xmlns="" w="9525">
                   <a:solidFill>
                     <a:srgbClr val="000000"/>
                   </a:solidFill>
@@ -1379,7 +1379,7 @@
             </a:ln>
             <a:extLst>
               <a:ext uri="{91240B29-F687-4f45-9708-019B960494DF}">
-                <a14:hiddenLine xmlns="" xmlns:a14="http://schemas.microsoft.com/office/drawing/2010/main" w="9525">
+                <a14:hiddenLine xmlns:a14="http://schemas.microsoft.com/office/drawing/2010/main" xmlns="" w="9525">
                   <a:solidFill>
                     <a:srgbClr val="000000"/>
                   </a:solidFill>
@@ -1469,7 +1469,7 @@
             </a:ln>
             <a:extLst>
               <a:ext uri="{91240B29-F687-4f45-9708-019B960494DF}">
-                <a14:hiddenLine xmlns="" xmlns:a14="http://schemas.microsoft.com/office/drawing/2010/main" w="9525">
+                <a14:hiddenLine xmlns:a14="http://schemas.microsoft.com/office/drawing/2010/main" xmlns="" w="9525">
                   <a:solidFill>
                     <a:srgbClr val="000000"/>
                   </a:solidFill>
@@ -1531,7 +1531,7 @@
             </a:ln>
             <a:extLst>
               <a:ext uri="{91240B29-F687-4f45-9708-019B960494DF}">
-                <a14:hiddenLine xmlns="" xmlns:a14="http://schemas.microsoft.com/office/drawing/2010/main" w="9525">
+                <a14:hiddenLine xmlns:a14="http://schemas.microsoft.com/office/drawing/2010/main" xmlns="" w="9525">
                   <a:solidFill>
                     <a:srgbClr val="000000"/>
                   </a:solidFill>
@@ -1621,7 +1621,7 @@
             </a:ln>
             <a:extLst>
               <a:ext uri="{91240B29-F687-4f45-9708-019B960494DF}">
-                <a14:hiddenLine xmlns="" xmlns:a14="http://schemas.microsoft.com/office/drawing/2010/main" w="9525">
+                <a14:hiddenLine xmlns:a14="http://schemas.microsoft.com/office/drawing/2010/main" xmlns="" w="9525">
                   <a:solidFill>
                     <a:srgbClr val="000000"/>
                   </a:solidFill>
@@ -1711,7 +1711,7 @@
             </a:ln>
             <a:extLst>
               <a:ext uri="{91240B29-F687-4f45-9708-019B960494DF}">
-                <a14:hiddenLine xmlns="" xmlns:a14="http://schemas.microsoft.com/office/drawing/2010/main" w="9525">
+                <a14:hiddenLine xmlns:a14="http://schemas.microsoft.com/office/drawing/2010/main" xmlns="" w="9525">
                   <a:solidFill>
                     <a:srgbClr val="000000"/>
                   </a:solidFill>
@@ -1767,7 +1767,7 @@
             </a:ln>
             <a:extLst>
               <a:ext uri="{91240B29-F687-4f45-9708-019B960494DF}">
-                <a14:hiddenLine xmlns="" xmlns:a14="http://schemas.microsoft.com/office/drawing/2010/main" w="9525">
+                <a14:hiddenLine xmlns:a14="http://schemas.microsoft.com/office/drawing/2010/main" xmlns="" w="9525">
                   <a:solidFill>
                     <a:srgbClr val="000000"/>
                   </a:solidFill>
@@ -1857,7 +1857,7 @@
             </a:ln>
             <a:extLst>
               <a:ext uri="{91240B29-F687-4f45-9708-019B960494DF}">
-                <a14:hiddenLine xmlns="" xmlns:a14="http://schemas.microsoft.com/office/drawing/2010/main" w="9525">
+                <a14:hiddenLine xmlns:a14="http://schemas.microsoft.com/office/drawing/2010/main" xmlns="" w="9525">
                   <a:solidFill>
                     <a:srgbClr val="000000"/>
                   </a:solidFill>
@@ -1913,7 +1913,7 @@
             </a:ln>
             <a:extLst>
               <a:ext uri="{91240B29-F687-4f45-9708-019B960494DF}">
-                <a14:hiddenLine xmlns="" xmlns:a14="http://schemas.microsoft.com/office/drawing/2010/main" w="9525">
+                <a14:hiddenLine xmlns:a14="http://schemas.microsoft.com/office/drawing/2010/main" xmlns="" w="9525">
                   <a:solidFill>
                     <a:srgbClr val="000000"/>
                   </a:solidFill>
@@ -2003,7 +2003,7 @@
             </a:ln>
             <a:extLst>
               <a:ext uri="{91240B29-F687-4f45-9708-019B960494DF}">
-                <a14:hiddenLine xmlns="" xmlns:a14="http://schemas.microsoft.com/office/drawing/2010/main" w="9525">
+                <a14:hiddenLine xmlns:a14="http://schemas.microsoft.com/office/drawing/2010/main" xmlns="" w="9525">
                   <a:solidFill>
                     <a:srgbClr val="000000"/>
                   </a:solidFill>
@@ -2071,7 +2071,7 @@
             </a:ln>
             <a:extLst>
               <a:ext uri="{91240B29-F687-4f45-9708-019B960494DF}">
-                <a14:hiddenLine xmlns="" xmlns:a14="http://schemas.microsoft.com/office/drawing/2010/main" w="9525">
+                <a14:hiddenLine xmlns:a14="http://schemas.microsoft.com/office/drawing/2010/main" xmlns="" w="9525">
                   <a:solidFill>
                     <a:srgbClr val="000000"/>
                   </a:solidFill>
@@ -2161,7 +2161,7 @@
             </a:ln>
             <a:extLst>
               <a:ext uri="{91240B29-F687-4f45-9708-019B960494DF}">
-                <a14:hiddenLine xmlns="" xmlns:a14="http://schemas.microsoft.com/office/drawing/2010/main" w="9525">
+                <a14:hiddenLine xmlns:a14="http://schemas.microsoft.com/office/drawing/2010/main" xmlns="" w="9525">
                   <a:solidFill>
                     <a:srgbClr val="000000"/>
                   </a:solidFill>
@@ -2229,7 +2229,7 @@
             </a:ln>
             <a:extLst>
               <a:ext uri="{91240B29-F687-4f45-9708-019B960494DF}">
-                <a14:hiddenLine xmlns="" xmlns:a14="http://schemas.microsoft.com/office/drawing/2010/main" w="9525">
+                <a14:hiddenLine xmlns:a14="http://schemas.microsoft.com/office/drawing/2010/main" xmlns="" w="9525">
                   <a:solidFill>
                     <a:srgbClr val="000000"/>
                   </a:solidFill>
@@ -2319,7 +2319,7 @@
             </a:ln>
             <a:extLst>
               <a:ext uri="{91240B29-F687-4f45-9708-019B960494DF}">
-                <a14:hiddenLine xmlns="" xmlns:a14="http://schemas.microsoft.com/office/drawing/2010/main" w="9525">
+                <a14:hiddenLine xmlns:a14="http://schemas.microsoft.com/office/drawing/2010/main" xmlns="" w="9525">
                   <a:solidFill>
                     <a:srgbClr val="000000"/>
                   </a:solidFill>
@@ -2353,7 +2353,7 @@
             </a:ln>
             <a:extLst>
               <a:ext uri="{91240B29-F687-4f45-9708-019B960494DF}">
-                <a14:hiddenLine xmlns="" xmlns:a14="http://schemas.microsoft.com/office/drawing/2010/main" w="9525">
+                <a14:hiddenLine xmlns:a14="http://schemas.microsoft.com/office/drawing/2010/main" xmlns="" w="9525">
                   <a:solidFill>
                     <a:srgbClr val="000000"/>
                   </a:solidFill>
@@ -2443,7 +2443,7 @@
             </a:ln>
             <a:extLst>
               <a:ext uri="{91240B29-F687-4f45-9708-019B960494DF}">
-                <a14:hiddenLine xmlns="" xmlns:a14="http://schemas.microsoft.com/office/drawing/2010/main" w="9525">
+                <a14:hiddenLine xmlns:a14="http://schemas.microsoft.com/office/drawing/2010/main" xmlns="" w="9525">
                   <a:solidFill>
                     <a:srgbClr val="000000"/>
                   </a:solidFill>
@@ -2505,7 +2505,7 @@
             </a:ln>
             <a:extLst>
               <a:ext uri="{91240B29-F687-4f45-9708-019B960494DF}">
-                <a14:hiddenLine xmlns="" xmlns:a14="http://schemas.microsoft.com/office/drawing/2010/main" w="9525">
+                <a14:hiddenLine xmlns:a14="http://schemas.microsoft.com/office/drawing/2010/main" xmlns="" w="9525">
                   <a:solidFill>
                     <a:srgbClr val="000000"/>
                   </a:solidFill>
@@ -2567,7 +2567,7 @@
             </a:ln>
             <a:extLst>
               <a:ext uri="{91240B29-F687-4f45-9708-019B960494DF}">
-                <a14:hiddenLine xmlns="" xmlns:a14="http://schemas.microsoft.com/office/drawing/2010/main" w="9525">
+                <a14:hiddenLine xmlns:a14="http://schemas.microsoft.com/office/drawing/2010/main" xmlns="" w="9525">
                   <a:solidFill>
                     <a:srgbClr val="000000"/>
                   </a:solidFill>
@@ -2657,7 +2657,7 @@
             </a:ln>
             <a:extLst>
               <a:ext uri="{91240B29-F687-4f45-9708-019B960494DF}">
-                <a14:hiddenLine xmlns="" xmlns:a14="http://schemas.microsoft.com/office/drawing/2010/main" w="9525">
+                <a14:hiddenLine xmlns:a14="http://schemas.microsoft.com/office/drawing/2010/main" xmlns="" w="9525">
                   <a:solidFill>
                     <a:srgbClr val="000000"/>
                   </a:solidFill>
@@ -2725,7 +2725,7 @@
             </a:ln>
             <a:extLst>
               <a:ext uri="{91240B29-F687-4f45-9708-019B960494DF}">
-                <a14:hiddenLine xmlns="" xmlns:a14="http://schemas.microsoft.com/office/drawing/2010/main" w="9525">
+                <a14:hiddenLine xmlns:a14="http://schemas.microsoft.com/office/drawing/2010/main" xmlns="" w="9525">
                   <a:solidFill>
                     <a:srgbClr val="000000"/>
                   </a:solidFill>
@@ -2787,7 +2787,7 @@
             </a:ln>
             <a:extLst>
               <a:ext uri="{91240B29-F687-4f45-9708-019B960494DF}">
-                <a14:hiddenLine xmlns="" xmlns:a14="http://schemas.microsoft.com/office/drawing/2010/main" w="9525">
+                <a14:hiddenLine xmlns:a14="http://schemas.microsoft.com/office/drawing/2010/main" xmlns="" w="9525">
                   <a:solidFill>
                     <a:srgbClr val="000000"/>
                   </a:solidFill>
@@ -2877,7 +2877,7 @@
             </a:ln>
             <a:extLst>
               <a:ext uri="{91240B29-F687-4f45-9708-019B960494DF}">
-                <a14:hiddenLine xmlns="" xmlns:a14="http://schemas.microsoft.com/office/drawing/2010/main" w="9525">
+                <a14:hiddenLine xmlns:a14="http://schemas.microsoft.com/office/drawing/2010/main" xmlns="" w="9525">
                   <a:solidFill>
                     <a:srgbClr val="000000"/>
                   </a:solidFill>
@@ -2939,7 +2939,7 @@
             </a:ln>
             <a:extLst>
               <a:ext uri="{91240B29-F687-4f45-9708-019B960494DF}">
-                <a14:hiddenLine xmlns="" xmlns:a14="http://schemas.microsoft.com/office/drawing/2010/main" w="9525">
+                <a14:hiddenLine xmlns:a14="http://schemas.microsoft.com/office/drawing/2010/main" xmlns="" w="9525">
                   <a:solidFill>
                     <a:srgbClr val="000000"/>
                   </a:solidFill>
@@ -3029,7 +3029,7 @@
             </a:ln>
             <a:extLst>
               <a:ext uri="{91240B29-F687-4f45-9708-019B960494DF}">
-                <a14:hiddenLine xmlns="" xmlns:a14="http://schemas.microsoft.com/office/drawing/2010/main" w="9525">
+                <a14:hiddenLine xmlns:a14="http://schemas.microsoft.com/office/drawing/2010/main" xmlns="" w="9525">
                   <a:solidFill>
                     <a:srgbClr val="000000"/>
                   </a:solidFill>
@@ -3091,7 +3091,7 @@
             </a:ln>
             <a:extLst>
               <a:ext uri="{91240B29-F687-4f45-9708-019B960494DF}">
-                <a14:hiddenLine xmlns="" xmlns:a14="http://schemas.microsoft.com/office/drawing/2010/main" w="9525">
+                <a14:hiddenLine xmlns:a14="http://schemas.microsoft.com/office/drawing/2010/main" xmlns="" w="9525">
                   <a:solidFill>
                     <a:srgbClr val="000000"/>
                   </a:solidFill>
@@ -3181,7 +3181,7 @@
             </a:ln>
             <a:extLst>
               <a:ext uri="{91240B29-F687-4f45-9708-019B960494DF}">
-                <a14:hiddenLine xmlns="" xmlns:a14="http://schemas.microsoft.com/office/drawing/2010/main" w="9525">
+                <a14:hiddenLine xmlns:a14="http://schemas.microsoft.com/office/drawing/2010/main" xmlns="" w="9525">
                   <a:solidFill>
                     <a:srgbClr val="000000"/>
                   </a:solidFill>
@@ -3215,7 +3215,7 @@
             </a:ln>
             <a:extLst>
               <a:ext uri="{91240B29-F687-4f45-9708-019B960494DF}">
-                <a14:hiddenLine xmlns="" xmlns:a14="http://schemas.microsoft.com/office/drawing/2010/main" w="9525">
+                <a14:hiddenLine xmlns:a14="http://schemas.microsoft.com/office/drawing/2010/main" xmlns="" w="9525">
                   <a:solidFill>
                     <a:srgbClr val="000000"/>
                   </a:solidFill>
@@ -3280,7 +3280,7 @@
             </a:ln>
             <a:extLst>
               <a:ext uri="{91240B29-F687-4f45-9708-019B960494DF}">
-                <a14:hiddenLine xmlns="" xmlns:a14="http://schemas.microsoft.com/office/drawing/2010/main" w="9525">
+                <a14:hiddenLine xmlns:a14="http://schemas.microsoft.com/office/drawing/2010/main" xmlns="" w="9525">
                   <a:solidFill>
                     <a:srgbClr val="000000"/>
                   </a:solidFill>
@@ -3370,7 +3370,7 @@
             </a:ln>
             <a:extLst>
               <a:ext uri="{91240B29-F687-4f45-9708-019B960494DF}">
-                <a14:hiddenLine xmlns="" xmlns:a14="http://schemas.microsoft.com/office/drawing/2010/main" w="9525">
+                <a14:hiddenLine xmlns:a14="http://schemas.microsoft.com/office/drawing/2010/main" xmlns="" w="9525">
                   <a:solidFill>
                     <a:srgbClr val="000000"/>
                   </a:solidFill>
@@ -3432,7 +3432,7 @@
             </a:ln>
             <a:extLst>
               <a:ext uri="{91240B29-F687-4f45-9708-019B960494DF}">
-                <a14:hiddenLine xmlns="" xmlns:a14="http://schemas.microsoft.com/office/drawing/2010/main" w="9525">
+                <a14:hiddenLine xmlns:a14="http://schemas.microsoft.com/office/drawing/2010/main" xmlns="" w="9525">
                   <a:solidFill>
                     <a:srgbClr val="000000"/>
                   </a:solidFill>
@@ -3522,7 +3522,7 @@
             </a:ln>
             <a:extLst>
               <a:ext uri="{91240B29-F687-4f45-9708-019B960494DF}">
-                <a14:hiddenLine xmlns="" xmlns:a14="http://schemas.microsoft.com/office/drawing/2010/main" w="9525">
+                <a14:hiddenLine xmlns:a14="http://schemas.microsoft.com/office/drawing/2010/main" xmlns="" w="9525">
                   <a:solidFill>
                     <a:srgbClr val="000000"/>
                   </a:solidFill>
@@ -3612,7 +3612,7 @@
             </a:ln>
             <a:extLst>
               <a:ext uri="{91240B29-F687-4f45-9708-019B960494DF}">
-                <a14:hiddenLine xmlns="" xmlns:a14="http://schemas.microsoft.com/office/drawing/2010/main" w="9525">
+                <a14:hiddenLine xmlns:a14="http://schemas.microsoft.com/office/drawing/2010/main" xmlns="" w="9525">
                   <a:solidFill>
                     <a:srgbClr val="000000"/>
                   </a:solidFill>
@@ -3677,7 +3677,7 @@
             </a:ln>
             <a:extLst>
               <a:ext uri="{91240B29-F687-4f45-9708-019B960494DF}">
-                <a14:hiddenLine xmlns="" xmlns:a14="http://schemas.microsoft.com/office/drawing/2010/main" w="9525">
+                <a14:hiddenLine xmlns:a14="http://schemas.microsoft.com/office/drawing/2010/main" xmlns="" w="9525">
                   <a:solidFill>
                     <a:srgbClr val="000000"/>
                   </a:solidFill>
@@ -3739,7 +3739,7 @@
             </a:ln>
             <a:extLst>
               <a:ext uri="{91240B29-F687-4f45-9708-019B960494DF}">
-                <a14:hiddenLine xmlns="" xmlns:a14="http://schemas.microsoft.com/office/drawing/2010/main" w="9525">
+                <a14:hiddenLine xmlns:a14="http://schemas.microsoft.com/office/drawing/2010/main" xmlns="" w="9525">
                   <a:solidFill>
                     <a:srgbClr val="000000"/>
                   </a:solidFill>
@@ -3829,7 +3829,7 @@
             </a:ln>
             <a:extLst>
               <a:ext uri="{91240B29-F687-4f45-9708-019B960494DF}">
-                <a14:hiddenLine xmlns="" xmlns:a14="http://schemas.microsoft.com/office/drawing/2010/main" w="9525">
+                <a14:hiddenLine xmlns:a14="http://schemas.microsoft.com/office/drawing/2010/main" xmlns="" w="9525">
                   <a:solidFill>
                     <a:srgbClr val="000000"/>
                   </a:solidFill>
@@ -3919,7 +3919,7 @@
             </a:ln>
             <a:extLst>
               <a:ext uri="{91240B29-F687-4f45-9708-019B960494DF}">
-                <a14:hiddenLine xmlns="" xmlns:a14="http://schemas.microsoft.com/office/drawing/2010/main" w="9525">
+                <a14:hiddenLine xmlns:a14="http://schemas.microsoft.com/office/drawing/2010/main" xmlns="" w="9525">
                   <a:solidFill>
                     <a:srgbClr val="000000"/>
                   </a:solidFill>
@@ -3981,7 +3981,7 @@
             </a:ln>
             <a:extLst>
               <a:ext uri="{91240B29-F687-4f45-9708-019B960494DF}">
-                <a14:hiddenLine xmlns="" xmlns:a14="http://schemas.microsoft.com/office/drawing/2010/main" w="9525">
+                <a14:hiddenLine xmlns:a14="http://schemas.microsoft.com/office/drawing/2010/main" xmlns="" w="9525">
                   <a:solidFill>
                     <a:srgbClr val="000000"/>
                   </a:solidFill>
@@ -4101,7 +4101,7 @@
             </a:ln>
             <a:extLst>
               <a:ext uri="{91240B29-F687-4f45-9708-019B960494DF}">
-                <a14:hiddenLine xmlns="" xmlns:a14="http://schemas.microsoft.com/office/drawing/2010/main" w="9525">
+                <a14:hiddenLine xmlns:a14="http://schemas.microsoft.com/office/drawing/2010/main" xmlns="" w="9525">
                   <a:solidFill>
                     <a:srgbClr val="000000"/>
                   </a:solidFill>
@@ -4169,7 +4169,7 @@
             </a:ln>
             <a:extLst>
               <a:ext uri="{91240B29-F687-4f45-9708-019B960494DF}">
-                <a14:hiddenLine xmlns="" xmlns:a14="http://schemas.microsoft.com/office/drawing/2010/main" w="9525">
+                <a14:hiddenLine xmlns:a14="http://schemas.microsoft.com/office/drawing/2010/main" xmlns="" w="9525">
                   <a:solidFill>
                     <a:srgbClr val="000000"/>
                   </a:solidFill>
@@ -4259,7 +4259,7 @@
             </a:ln>
             <a:extLst>
               <a:ext uri="{91240B29-F687-4f45-9708-019B960494DF}">
-                <a14:hiddenLine xmlns="" xmlns:a14="http://schemas.microsoft.com/office/drawing/2010/main" w="9525">
+                <a14:hiddenLine xmlns:a14="http://schemas.microsoft.com/office/drawing/2010/main" xmlns="" w="9525">
                   <a:solidFill>
                     <a:srgbClr val="000000"/>
                   </a:solidFill>
@@ -4399,7 +4399,7 @@
           <a:p>
             <a:fld id="{0A11B395-7D07-4B8D-B5CA-22340B359237}" type="datetimeFigureOut">
               <a:rPr lang="en-CA" smtClean="0"/>
-              <a:t>2018-01-24</a:t>
+              <a:t>2018-01-25</a:t>
             </a:fld>
             <a:endParaRPr lang="en-CA"/>
           </a:p>
@@ -4666,7 +4666,7 @@
           <a:p>
             <a:fld id="{0A11B395-7D07-4B8D-B5CA-22340B359237}" type="datetimeFigureOut">
               <a:rPr lang="en-CA" smtClean="0"/>
-              <a:t>2018-01-24</a:t>
+              <a:t>2018-01-25</a:t>
             </a:fld>
             <a:endParaRPr lang="en-CA"/>
           </a:p>
@@ -4862,7 +4862,7 @@
           <a:p>
             <a:fld id="{0A11B395-7D07-4B8D-B5CA-22340B359237}" type="datetimeFigureOut">
               <a:rPr lang="en-CA" smtClean="0"/>
-              <a:t>2018-01-24</a:t>
+              <a:t>2018-01-25</a:t>
             </a:fld>
             <a:endParaRPr lang="en-CA"/>
           </a:p>
@@ -5125,7 +5125,7 @@
           <a:p>
             <a:fld id="{0A11B395-7D07-4B8D-B5CA-22340B359237}" type="datetimeFigureOut">
               <a:rPr lang="en-CA" smtClean="0"/>
-              <a:t>2018-01-24</a:t>
+              <a:t>2018-01-25</a:t>
             </a:fld>
             <a:endParaRPr lang="en-CA"/>
           </a:p>
@@ -5559,7 +5559,7 @@
           <a:p>
             <a:fld id="{0A11B395-7D07-4B8D-B5CA-22340B359237}" type="datetimeFigureOut">
               <a:rPr lang="en-CA" smtClean="0"/>
-              <a:t>2018-01-24</a:t>
+              <a:t>2018-01-25</a:t>
             </a:fld>
             <a:endParaRPr lang="en-CA"/>
           </a:p>
@@ -6105,7 +6105,7 @@
           <a:p>
             <a:fld id="{0A11B395-7D07-4B8D-B5CA-22340B359237}" type="datetimeFigureOut">
               <a:rPr lang="en-CA" smtClean="0"/>
-              <a:t>2018-01-24</a:t>
+              <a:t>2018-01-25</a:t>
             </a:fld>
             <a:endParaRPr lang="en-CA"/>
           </a:p>
@@ -6825,7 +6825,7 @@
           <a:p>
             <a:fld id="{0A11B395-7D07-4B8D-B5CA-22340B359237}" type="datetimeFigureOut">
               <a:rPr lang="en-CA" smtClean="0"/>
-              <a:t>2018-01-24</a:t>
+              <a:t>2018-01-25</a:t>
             </a:fld>
             <a:endParaRPr lang="en-CA"/>
           </a:p>
@@ -6995,7 +6995,7 @@
           <a:p>
             <a:fld id="{0A11B395-7D07-4B8D-B5CA-22340B359237}" type="datetimeFigureOut">
               <a:rPr lang="en-CA" smtClean="0"/>
-              <a:t>2018-01-24</a:t>
+              <a:t>2018-01-25</a:t>
             </a:fld>
             <a:endParaRPr lang="en-CA"/>
           </a:p>
@@ -7175,7 +7175,7 @@
           <a:p>
             <a:fld id="{0A11B395-7D07-4B8D-B5CA-22340B359237}" type="datetimeFigureOut">
               <a:rPr lang="en-CA" smtClean="0"/>
-              <a:t>2018-01-24</a:t>
+              <a:t>2018-01-25</a:t>
             </a:fld>
             <a:endParaRPr lang="en-CA"/>
           </a:p>
@@ -7345,7 +7345,7 @@
           <a:p>
             <a:fld id="{0A11B395-7D07-4B8D-B5CA-22340B359237}" type="datetimeFigureOut">
               <a:rPr lang="en-CA" smtClean="0"/>
-              <a:t>2018-01-24</a:t>
+              <a:t>2018-01-25</a:t>
             </a:fld>
             <a:endParaRPr lang="en-CA"/>
           </a:p>
@@ -7595,7 +7595,7 @@
           <a:p>
             <a:fld id="{0A11B395-7D07-4B8D-B5CA-22340B359237}" type="datetimeFigureOut">
               <a:rPr lang="en-CA" smtClean="0"/>
-              <a:t>2018-01-24</a:t>
+              <a:t>2018-01-25</a:t>
             </a:fld>
             <a:endParaRPr lang="en-CA"/>
           </a:p>
@@ -7827,7 +7827,7 @@
           <a:p>
             <a:fld id="{0A11B395-7D07-4B8D-B5CA-22340B359237}" type="datetimeFigureOut">
               <a:rPr lang="en-CA" smtClean="0"/>
-              <a:t>2018-01-24</a:t>
+              <a:t>2018-01-25</a:t>
             </a:fld>
             <a:endParaRPr lang="en-CA"/>
           </a:p>
@@ -8208,7 +8208,7 @@
           <a:p>
             <a:fld id="{0A11B395-7D07-4B8D-B5CA-22340B359237}" type="datetimeFigureOut">
               <a:rPr lang="en-CA" smtClean="0"/>
-              <a:t>2018-01-24</a:t>
+              <a:t>2018-01-25</a:t>
             </a:fld>
             <a:endParaRPr lang="en-CA"/>
           </a:p>
@@ -8326,7 +8326,7 @@
           <a:p>
             <a:fld id="{0A11B395-7D07-4B8D-B5CA-22340B359237}" type="datetimeFigureOut">
               <a:rPr lang="en-CA" smtClean="0"/>
-              <a:t>2018-01-24</a:t>
+              <a:t>2018-01-25</a:t>
             </a:fld>
             <a:endParaRPr lang="en-CA"/>
           </a:p>
@@ -8421,7 +8421,7 @@
           <a:p>
             <a:fld id="{0A11B395-7D07-4B8D-B5CA-22340B359237}" type="datetimeFigureOut">
               <a:rPr lang="en-CA" smtClean="0"/>
-              <a:t>2018-01-24</a:t>
+              <a:t>2018-01-25</a:t>
             </a:fld>
             <a:endParaRPr lang="en-CA"/>
           </a:p>
@@ -8670,7 +8670,7 @@
           <a:p>
             <a:fld id="{0A11B395-7D07-4B8D-B5CA-22340B359237}" type="datetimeFigureOut">
               <a:rPr lang="en-CA" smtClean="0"/>
-              <a:t>2018-01-24</a:t>
+              <a:t>2018-01-25</a:t>
             </a:fld>
             <a:endParaRPr lang="en-CA"/>
           </a:p>
@@ -8950,7 +8950,7 @@
           <a:p>
             <a:fld id="{0A11B395-7D07-4B8D-B5CA-22340B359237}" type="datetimeFigureOut">
               <a:rPr lang="en-CA" smtClean="0"/>
-              <a:t>2018-01-24</a:t>
+              <a:t>2018-01-25</a:t>
             </a:fld>
             <a:endParaRPr lang="en-CA"/>
           </a:p>
@@ -9066,7 +9066,7 @@
           <a:noFill/>
           <a:extLst>
             <a:ext uri="{909E8E84-426E-40dd-AFC4-6F175D3DCCD1}">
-              <a14:hiddenFill xmlns="" xmlns:a14="http://schemas.microsoft.com/office/drawing/2010/main">
+              <a14:hiddenFill xmlns:a14="http://schemas.microsoft.com/office/drawing/2010/main" xmlns="">
                 <a:solidFill>
                   <a:srgbClr val="FFFFFF"/>
                 </a:solidFill>
@@ -9140,7 +9140,7 @@
               </a:ln>
               <a:extLst>
                 <a:ext uri="{91240B29-F687-4f45-9708-019B960494DF}">
-                  <a14:hiddenLine xmlns="" xmlns:a14="http://schemas.microsoft.com/office/drawing/2010/main" w="9525">
+                  <a14:hiddenLine xmlns:a14="http://schemas.microsoft.com/office/drawing/2010/main" xmlns="" w="9525">
                     <a:solidFill>
                       <a:srgbClr val="000000"/>
                     </a:solidFill>
@@ -9230,7 +9230,7 @@
               </a:ln>
               <a:extLst>
                 <a:ext uri="{91240B29-F687-4f45-9708-019B960494DF}">
-                  <a14:hiddenLine xmlns="" xmlns:a14="http://schemas.microsoft.com/office/drawing/2010/main" w="9525">
+                  <a14:hiddenLine xmlns:a14="http://schemas.microsoft.com/office/drawing/2010/main" xmlns="" w="9525">
                     <a:solidFill>
                       <a:srgbClr val="000000"/>
                     </a:solidFill>
@@ -9320,7 +9320,7 @@
               </a:ln>
               <a:extLst>
                 <a:ext uri="{91240B29-F687-4f45-9708-019B960494DF}">
-                  <a14:hiddenLine xmlns="" xmlns:a14="http://schemas.microsoft.com/office/drawing/2010/main" w="9525">
+                  <a14:hiddenLine xmlns:a14="http://schemas.microsoft.com/office/drawing/2010/main" xmlns="" w="9525">
                     <a:solidFill>
                       <a:srgbClr val="000000"/>
                     </a:solidFill>
@@ -9382,7 +9382,7 @@
               </a:ln>
               <a:extLst>
                 <a:ext uri="{91240B29-F687-4f45-9708-019B960494DF}">
-                  <a14:hiddenLine xmlns="" xmlns:a14="http://schemas.microsoft.com/office/drawing/2010/main" w="9525">
+                  <a14:hiddenLine xmlns:a14="http://schemas.microsoft.com/office/drawing/2010/main" xmlns="" w="9525">
                     <a:solidFill>
                       <a:srgbClr val="000000"/>
                     </a:solidFill>
@@ -9472,7 +9472,7 @@
               </a:ln>
               <a:extLst>
                 <a:ext uri="{91240B29-F687-4f45-9708-019B960494DF}">
-                  <a14:hiddenLine xmlns="" xmlns:a14="http://schemas.microsoft.com/office/drawing/2010/main" w="9525">
+                  <a14:hiddenLine xmlns:a14="http://schemas.microsoft.com/office/drawing/2010/main" xmlns="" w="9525">
                     <a:solidFill>
                       <a:srgbClr val="000000"/>
                     </a:solidFill>
@@ -9534,7 +9534,7 @@
               </a:ln>
               <a:extLst>
                 <a:ext uri="{91240B29-F687-4f45-9708-019B960494DF}">
-                  <a14:hiddenLine xmlns="" xmlns:a14="http://schemas.microsoft.com/office/drawing/2010/main" w="9525">
+                  <a14:hiddenLine xmlns:a14="http://schemas.microsoft.com/office/drawing/2010/main" xmlns="" w="9525">
                     <a:solidFill>
                       <a:srgbClr val="000000"/>
                     </a:solidFill>
@@ -9596,7 +9596,7 @@
               </a:ln>
               <a:extLst>
                 <a:ext uri="{91240B29-F687-4f45-9708-019B960494DF}">
-                  <a14:hiddenLine xmlns="" xmlns:a14="http://schemas.microsoft.com/office/drawing/2010/main" w="9525">
+                  <a14:hiddenLine xmlns:a14="http://schemas.microsoft.com/office/drawing/2010/main" xmlns="" w="9525">
                     <a:solidFill>
                       <a:srgbClr val="000000"/>
                     </a:solidFill>
@@ -9686,7 +9686,7 @@
               </a:ln>
               <a:extLst>
                 <a:ext uri="{91240B29-F687-4f45-9708-019B960494DF}">
-                  <a14:hiddenLine xmlns="" xmlns:a14="http://schemas.microsoft.com/office/drawing/2010/main" w="9525">
+                  <a14:hiddenLine xmlns:a14="http://schemas.microsoft.com/office/drawing/2010/main" xmlns="" w="9525">
                     <a:solidFill>
                       <a:srgbClr val="000000"/>
                     </a:solidFill>
@@ -9776,7 +9776,7 @@
               </a:ln>
               <a:extLst>
                 <a:ext uri="{91240B29-F687-4f45-9708-019B960494DF}">
-                  <a14:hiddenLine xmlns="" xmlns:a14="http://schemas.microsoft.com/office/drawing/2010/main" w="9525">
+                  <a14:hiddenLine xmlns:a14="http://schemas.microsoft.com/office/drawing/2010/main" xmlns="" w="9525">
                     <a:solidFill>
                       <a:srgbClr val="000000"/>
                     </a:solidFill>
@@ -9838,7 +9838,7 @@
               </a:ln>
               <a:extLst>
                 <a:ext uri="{91240B29-F687-4f45-9708-019B960494DF}">
-                  <a14:hiddenLine xmlns="" xmlns:a14="http://schemas.microsoft.com/office/drawing/2010/main" w="9525">
+                  <a14:hiddenLine xmlns:a14="http://schemas.microsoft.com/office/drawing/2010/main" xmlns="" w="9525">
                     <a:solidFill>
                       <a:srgbClr val="000000"/>
                     </a:solidFill>
@@ -9948,7 +9948,7 @@
               </a:ln>
               <a:extLst>
                 <a:ext uri="{91240B29-F687-4f45-9708-019B960494DF}">
-                  <a14:hiddenLine xmlns="" xmlns:a14="http://schemas.microsoft.com/office/drawing/2010/main" w="9525">
+                  <a14:hiddenLine xmlns:a14="http://schemas.microsoft.com/office/drawing/2010/main" xmlns="" w="9525">
                     <a:solidFill>
                       <a:srgbClr val="000000"/>
                     </a:solidFill>
@@ -10032,7 +10032,7 @@
               </a:ln>
               <a:extLst>
                 <a:ext uri="{91240B29-F687-4f45-9708-019B960494DF}">
-                  <a14:hiddenLine xmlns="" xmlns:a14="http://schemas.microsoft.com/office/drawing/2010/main" w="9525">
+                  <a14:hiddenLine xmlns:a14="http://schemas.microsoft.com/office/drawing/2010/main" xmlns="" w="9525">
                     <a:solidFill>
                       <a:srgbClr val="000000"/>
                     </a:solidFill>
@@ -10094,7 +10094,7 @@
               </a:ln>
               <a:extLst>
                 <a:ext uri="{91240B29-F687-4f45-9708-019B960494DF}">
-                  <a14:hiddenLine xmlns="" xmlns:a14="http://schemas.microsoft.com/office/drawing/2010/main" w="9525">
+                  <a14:hiddenLine xmlns:a14="http://schemas.microsoft.com/office/drawing/2010/main" xmlns="" w="9525">
                     <a:solidFill>
                       <a:srgbClr val="000000"/>
                     </a:solidFill>
@@ -10156,7 +10156,7 @@
               </a:ln>
               <a:extLst>
                 <a:ext uri="{91240B29-F687-4f45-9708-019B960494DF}">
-                  <a14:hiddenLine xmlns="" xmlns:a14="http://schemas.microsoft.com/office/drawing/2010/main" w="9525">
+                  <a14:hiddenLine xmlns:a14="http://schemas.microsoft.com/office/drawing/2010/main" xmlns="" w="9525">
                     <a:solidFill>
                       <a:srgbClr val="000000"/>
                     </a:solidFill>
@@ -10246,7 +10246,7 @@
               </a:ln>
               <a:extLst>
                 <a:ext uri="{91240B29-F687-4f45-9708-019B960494DF}">
-                  <a14:hiddenLine xmlns="" xmlns:a14="http://schemas.microsoft.com/office/drawing/2010/main" w="9525">
+                  <a14:hiddenLine xmlns:a14="http://schemas.microsoft.com/office/drawing/2010/main" xmlns="" w="9525">
                     <a:solidFill>
                       <a:srgbClr val="000000"/>
                     </a:solidFill>
@@ -10280,7 +10280,7 @@
               </a:ln>
               <a:extLst>
                 <a:ext uri="{91240B29-F687-4f45-9708-019B960494DF}">
-                  <a14:hiddenLine xmlns="" xmlns:a14="http://schemas.microsoft.com/office/drawing/2010/main" w="9525">
+                  <a14:hiddenLine xmlns:a14="http://schemas.microsoft.com/office/drawing/2010/main" xmlns="" w="9525">
                     <a:solidFill>
                       <a:srgbClr val="000000"/>
                     </a:solidFill>
@@ -10345,7 +10345,7 @@
               </a:ln>
               <a:extLst>
                 <a:ext uri="{91240B29-F687-4f45-9708-019B960494DF}">
-                  <a14:hiddenLine xmlns="" xmlns:a14="http://schemas.microsoft.com/office/drawing/2010/main" w="9525">
+                  <a14:hiddenLine xmlns:a14="http://schemas.microsoft.com/office/drawing/2010/main" xmlns="" w="9525">
                     <a:solidFill>
                       <a:srgbClr val="000000"/>
                     </a:solidFill>
@@ -10435,7 +10435,7 @@
               </a:ln>
               <a:extLst>
                 <a:ext uri="{91240B29-F687-4f45-9708-019B960494DF}">
-                  <a14:hiddenLine xmlns="" xmlns:a14="http://schemas.microsoft.com/office/drawing/2010/main" w="9525">
+                  <a14:hiddenLine xmlns:a14="http://schemas.microsoft.com/office/drawing/2010/main" xmlns="" w="9525">
                     <a:solidFill>
                       <a:srgbClr val="000000"/>
                     </a:solidFill>
@@ -10497,7 +10497,7 @@
               </a:ln>
               <a:extLst>
                 <a:ext uri="{91240B29-F687-4f45-9708-019B960494DF}">
-                  <a14:hiddenLine xmlns="" xmlns:a14="http://schemas.microsoft.com/office/drawing/2010/main" w="9525">
+                  <a14:hiddenLine xmlns:a14="http://schemas.microsoft.com/office/drawing/2010/main" xmlns="" w="9525">
                     <a:solidFill>
                       <a:srgbClr val="000000"/>
                     </a:solidFill>
@@ -10587,7 +10587,7 @@
               </a:ln>
               <a:extLst>
                 <a:ext uri="{91240B29-F687-4f45-9708-019B960494DF}">
-                  <a14:hiddenLine xmlns="" xmlns:a14="http://schemas.microsoft.com/office/drawing/2010/main" w="9525">
+                  <a14:hiddenLine xmlns:a14="http://schemas.microsoft.com/office/drawing/2010/main" xmlns="" w="9525">
                     <a:solidFill>
                       <a:srgbClr val="000000"/>
                     </a:solidFill>
@@ -10652,7 +10652,7 @@
               </a:ln>
               <a:extLst>
                 <a:ext uri="{91240B29-F687-4f45-9708-019B960494DF}">
-                  <a14:hiddenLine xmlns="" xmlns:a14="http://schemas.microsoft.com/office/drawing/2010/main" w="9525">
+                  <a14:hiddenLine xmlns:a14="http://schemas.microsoft.com/office/drawing/2010/main" xmlns="" w="9525">
                     <a:solidFill>
                       <a:srgbClr val="000000"/>
                     </a:solidFill>
@@ -10714,7 +10714,7 @@
               </a:ln>
               <a:extLst>
                 <a:ext uri="{91240B29-F687-4f45-9708-019B960494DF}">
-                  <a14:hiddenLine xmlns="" xmlns:a14="http://schemas.microsoft.com/office/drawing/2010/main" w="9525">
+                  <a14:hiddenLine xmlns:a14="http://schemas.microsoft.com/office/drawing/2010/main" xmlns="" w="9525">
                     <a:solidFill>
                       <a:srgbClr val="000000"/>
                     </a:solidFill>
@@ -10804,7 +10804,7 @@
               </a:ln>
               <a:extLst>
                 <a:ext uri="{91240B29-F687-4f45-9708-019B960494DF}">
-                  <a14:hiddenLine xmlns="" xmlns:a14="http://schemas.microsoft.com/office/drawing/2010/main" w="9525">
+                  <a14:hiddenLine xmlns:a14="http://schemas.microsoft.com/office/drawing/2010/main" xmlns="" w="9525">
                     <a:solidFill>
                       <a:srgbClr val="000000"/>
                     </a:solidFill>
@@ -10894,7 +10894,7 @@
               </a:ln>
               <a:extLst>
                 <a:ext uri="{91240B29-F687-4f45-9708-019B960494DF}">
-                  <a14:hiddenLine xmlns="" xmlns:a14="http://schemas.microsoft.com/office/drawing/2010/main" w="9525">
+                  <a14:hiddenLine xmlns:a14="http://schemas.microsoft.com/office/drawing/2010/main" xmlns="" w="9525">
                     <a:solidFill>
                       <a:srgbClr val="000000"/>
                     </a:solidFill>
@@ -10959,7 +10959,7 @@
               </a:ln>
               <a:extLst>
                 <a:ext uri="{91240B29-F687-4f45-9708-019B960494DF}">
-                  <a14:hiddenLine xmlns="" xmlns:a14="http://schemas.microsoft.com/office/drawing/2010/main" w="9525">
+                  <a14:hiddenLine xmlns:a14="http://schemas.microsoft.com/office/drawing/2010/main" xmlns="" w="9525">
                     <a:solidFill>
                       <a:srgbClr val="000000"/>
                     </a:solidFill>
@@ -11079,7 +11079,7 @@
               </a:ln>
               <a:extLst>
                 <a:ext uri="{91240B29-F687-4f45-9708-019B960494DF}">
-                  <a14:hiddenLine xmlns="" xmlns:a14="http://schemas.microsoft.com/office/drawing/2010/main" w="9525">
+                  <a14:hiddenLine xmlns:a14="http://schemas.microsoft.com/office/drawing/2010/main" xmlns="" w="9525">
                     <a:solidFill>
                       <a:srgbClr val="000000"/>
                     </a:solidFill>
@@ -11177,7 +11177,7 @@
               </a:ln>
               <a:extLst>
                 <a:ext uri="{91240B29-F687-4f45-9708-019B960494DF}">
-                  <a14:hiddenLine xmlns="" xmlns:a14="http://schemas.microsoft.com/office/drawing/2010/main" w="9525">
+                  <a14:hiddenLine xmlns:a14="http://schemas.microsoft.com/office/drawing/2010/main" xmlns="" w="9525">
                     <a:solidFill>
                       <a:srgbClr val="000000"/>
                     </a:solidFill>
@@ -11292,7 +11292,7 @@
               </a:ln>
               <a:extLst>
                 <a:ext uri="{91240B29-F687-4f45-9708-019B960494DF}">
-                  <a14:hiddenLine xmlns="" xmlns:a14="http://schemas.microsoft.com/office/drawing/2010/main" w="9525">
+                  <a14:hiddenLine xmlns:a14="http://schemas.microsoft.com/office/drawing/2010/main" xmlns="" w="9525">
                     <a:solidFill>
                       <a:srgbClr val="000000"/>
                     </a:solidFill>
@@ -11382,7 +11382,7 @@
               </a:ln>
               <a:extLst>
                 <a:ext uri="{91240B29-F687-4f45-9708-019B960494DF}">
-                  <a14:hiddenLine xmlns="" xmlns:a14="http://schemas.microsoft.com/office/drawing/2010/main" w="9525">
+                  <a14:hiddenLine xmlns:a14="http://schemas.microsoft.com/office/drawing/2010/main" xmlns="" w="9525">
                     <a:solidFill>
                       <a:srgbClr val="000000"/>
                     </a:solidFill>
@@ -11447,7 +11447,7 @@
               </a:ln>
               <a:extLst>
                 <a:ext uri="{91240B29-F687-4f45-9708-019B960494DF}">
-                  <a14:hiddenLine xmlns="" xmlns:a14="http://schemas.microsoft.com/office/drawing/2010/main" w="9525">
+                  <a14:hiddenLine xmlns:a14="http://schemas.microsoft.com/office/drawing/2010/main" xmlns="" w="9525">
                     <a:solidFill>
                       <a:srgbClr val="000000"/>
                     </a:solidFill>
@@ -11537,7 +11537,7 @@
               </a:ln>
               <a:extLst>
                 <a:ext uri="{91240B29-F687-4f45-9708-019B960494DF}">
-                  <a14:hiddenLine xmlns="" xmlns:a14="http://schemas.microsoft.com/office/drawing/2010/main" w="9525">
+                  <a14:hiddenLine xmlns:a14="http://schemas.microsoft.com/office/drawing/2010/main" xmlns="" w="9525">
                     <a:solidFill>
                       <a:srgbClr val="000000"/>
                     </a:solidFill>
@@ -11605,7 +11605,7 @@
               </a:ln>
               <a:extLst>
                 <a:ext uri="{91240B29-F687-4f45-9708-019B960494DF}">
-                  <a14:hiddenLine xmlns="" xmlns:a14="http://schemas.microsoft.com/office/drawing/2010/main" w="9525">
+                  <a14:hiddenLine xmlns:a14="http://schemas.microsoft.com/office/drawing/2010/main" xmlns="" w="9525">
                     <a:solidFill>
                       <a:srgbClr val="000000"/>
                     </a:solidFill>
@@ -11695,7 +11695,7 @@
               </a:ln>
               <a:extLst>
                 <a:ext uri="{91240B29-F687-4f45-9708-019B960494DF}">
-                  <a14:hiddenLine xmlns="" xmlns:a14="http://schemas.microsoft.com/office/drawing/2010/main" w="9525">
+                  <a14:hiddenLine xmlns:a14="http://schemas.microsoft.com/office/drawing/2010/main" xmlns="" w="9525">
                     <a:solidFill>
                       <a:srgbClr val="000000"/>
                     </a:solidFill>
@@ -11763,7 +11763,7 @@
               </a:ln>
               <a:extLst>
                 <a:ext uri="{91240B29-F687-4f45-9708-019B960494DF}">
-                  <a14:hiddenLine xmlns="" xmlns:a14="http://schemas.microsoft.com/office/drawing/2010/main" w="9525">
+                  <a14:hiddenLine xmlns:a14="http://schemas.microsoft.com/office/drawing/2010/main" xmlns="" w="9525">
                     <a:solidFill>
                       <a:srgbClr val="000000"/>
                     </a:solidFill>
@@ -11853,7 +11853,7 @@
               </a:ln>
               <a:extLst>
                 <a:ext uri="{91240B29-F687-4f45-9708-019B960494DF}">
-                  <a14:hiddenLine xmlns="" xmlns:a14="http://schemas.microsoft.com/office/drawing/2010/main" w="9525">
+                  <a14:hiddenLine xmlns:a14="http://schemas.microsoft.com/office/drawing/2010/main" xmlns="" w="9525">
                     <a:solidFill>
                       <a:srgbClr val="000000"/>
                     </a:solidFill>
@@ -11887,7 +11887,7 @@
               </a:ln>
               <a:extLst>
                 <a:ext uri="{91240B29-F687-4f45-9708-019B960494DF}">
-                  <a14:hiddenLine xmlns="" xmlns:a14="http://schemas.microsoft.com/office/drawing/2010/main" w="9525">
+                  <a14:hiddenLine xmlns:a14="http://schemas.microsoft.com/office/drawing/2010/main" xmlns="" w="9525">
                     <a:solidFill>
                       <a:srgbClr val="000000"/>
                     </a:solidFill>
@@ -12027,7 +12027,7 @@
           <a:p>
             <a:fld id="{0A11B395-7D07-4B8D-B5CA-22340B359237}" type="datetimeFigureOut">
               <a:rPr lang="en-CA" smtClean="0"/>
-              <a:t>2018-01-24</a:t>
+              <a:t>2018-01-25</a:t>
             </a:fld>
             <a:endParaRPr lang="en-CA"/>
           </a:p>
@@ -13143,7 +13143,7 @@
             </a:pPr>
             <a:r>
               <a:rPr lang="en-US" dirty="0"/>
-              <a:t>It was good, </a:t>
+              <a:t>We became more comfortable using </a:t>
             </a:r>
             <a:r>
               <a:rPr lang="en-US" dirty="0" err="1"/>
@@ -13151,8 +13151,13 @@
             </a:r>
             <a:r>
               <a:rPr lang="en-US" dirty="0"/>
-              <a:t> sucks</a:t>
+              <a:t> which made making the future state diagram </a:t>
             </a:r>
+            <a:r>
+              <a:rPr lang="en-US" dirty="0" err="1"/>
+              <a:t>easyer</a:t>
+            </a:r>
+            <a:endParaRPr lang="en-US" dirty="0"/>
           </a:p>
           <a:p>
             <a:pPr>
@@ -13201,7 +13206,7 @@
             </a:pPr>
             <a:r>
               <a:rPr lang="en-US" dirty="0"/>
-              <a:t>We will use our future state diagram for milestone 3</a:t>
+              <a:t>We will use our future state diagram for our user story map in milestone 3</a:t>
             </a:r>
           </a:p>
           <a:p>
@@ -13219,7 +13224,7 @@
             </a:pPr>
             <a:r>
               <a:rPr lang="en-CA" dirty="0"/>
-              <a:t>Stick people!!!!!!!</a:t>
+              <a:t>We are not sure what to put for participant name</a:t>
             </a:r>
           </a:p>
         </p:txBody>

</xml_diff>